<commit_message>
UPD: collect_mouse_info_df includes epoch_len_sec
</commit_message>
<xml_diff>
--- a/faster2lib/EEG_power_specrum_template.pptx
+++ b/faster2lib/EEG_power_specrum_template.pptx
@@ -202,7 +202,7 @@
           <a:p>
             <a:fld id="{659F289F-6C09-4E41-AB64-F4FBAF604A8F}" type="datetimeFigureOut">
               <a:rPr kumimoji="1" lang="ja-JP" altLang="en-US" smtClean="0"/>
-              <a:t>2022/12/24</a:t>
+              <a:t>2022/12/25</a:t>
             </a:fld>
             <a:endParaRPr kumimoji="1" lang="ja-JP" altLang="en-US"/>
           </a:p>
@@ -733,7 +733,7 @@
           <a:p>
             <a:fld id="{B3DF8FAD-2AB0-4DA8-8497-F48AD089473F}" type="datetimeFigureOut">
               <a:rPr kumimoji="1" lang="ja-JP" altLang="en-US" smtClean="0"/>
-              <a:t>2022/12/24</a:t>
+              <a:t>2022/12/25</a:t>
             </a:fld>
             <a:endParaRPr kumimoji="1" lang="ja-JP" altLang="en-US"/>
           </a:p>
@@ -935,7 +935,7 @@
           <a:p>
             <a:fld id="{B3DF8FAD-2AB0-4DA8-8497-F48AD089473F}" type="datetimeFigureOut">
               <a:rPr kumimoji="1" lang="ja-JP" altLang="en-US" smtClean="0"/>
-              <a:t>2022/12/24</a:t>
+              <a:t>2022/12/25</a:t>
             </a:fld>
             <a:endParaRPr kumimoji="1" lang="ja-JP" altLang="en-US"/>
           </a:p>
@@ -1147,7 +1147,7 @@
           <a:p>
             <a:fld id="{B3DF8FAD-2AB0-4DA8-8497-F48AD089473F}" type="datetimeFigureOut">
               <a:rPr kumimoji="1" lang="ja-JP" altLang="en-US" smtClean="0"/>
-              <a:t>2022/12/24</a:t>
+              <a:t>2022/12/25</a:t>
             </a:fld>
             <a:endParaRPr kumimoji="1" lang="ja-JP" altLang="en-US"/>
           </a:p>
@@ -1349,7 +1349,7 @@
           <a:p>
             <a:fld id="{B3DF8FAD-2AB0-4DA8-8497-F48AD089473F}" type="datetimeFigureOut">
               <a:rPr kumimoji="1" lang="ja-JP" altLang="en-US" smtClean="0"/>
-              <a:t>2022/12/24</a:t>
+              <a:t>2022/12/25</a:t>
             </a:fld>
             <a:endParaRPr kumimoji="1" lang="ja-JP" altLang="en-US"/>
           </a:p>
@@ -1595,7 +1595,7 @@
           <a:p>
             <a:fld id="{B3DF8FAD-2AB0-4DA8-8497-F48AD089473F}" type="datetimeFigureOut">
               <a:rPr kumimoji="1" lang="ja-JP" altLang="en-US" smtClean="0"/>
-              <a:t>2022/12/24</a:t>
+              <a:t>2022/12/25</a:t>
             </a:fld>
             <a:endParaRPr kumimoji="1" lang="ja-JP" altLang="en-US"/>
           </a:p>
@@ -1891,7 +1891,7 @@
           <a:p>
             <a:fld id="{B3DF8FAD-2AB0-4DA8-8497-F48AD089473F}" type="datetimeFigureOut">
               <a:rPr kumimoji="1" lang="ja-JP" altLang="en-US" smtClean="0"/>
-              <a:t>2022/12/24</a:t>
+              <a:t>2022/12/25</a:t>
             </a:fld>
             <a:endParaRPr kumimoji="1" lang="ja-JP" altLang="en-US"/>
           </a:p>
@@ -2322,7 +2322,7 @@
           <a:p>
             <a:fld id="{B3DF8FAD-2AB0-4DA8-8497-F48AD089473F}" type="datetimeFigureOut">
               <a:rPr kumimoji="1" lang="ja-JP" altLang="en-US" smtClean="0"/>
-              <a:t>2022/12/24</a:t>
+              <a:t>2022/12/25</a:t>
             </a:fld>
             <a:endParaRPr kumimoji="1" lang="ja-JP" altLang="en-US"/>
           </a:p>
@@ -2440,7 +2440,7 @@
           <a:p>
             <a:fld id="{B3DF8FAD-2AB0-4DA8-8497-F48AD089473F}" type="datetimeFigureOut">
               <a:rPr kumimoji="1" lang="ja-JP" altLang="en-US" smtClean="0"/>
-              <a:t>2022/12/24</a:t>
+              <a:t>2022/12/25</a:t>
             </a:fld>
             <a:endParaRPr kumimoji="1" lang="ja-JP" altLang="en-US"/>
           </a:p>
@@ -2535,7 +2535,7 @@
           <a:p>
             <a:fld id="{B3DF8FAD-2AB0-4DA8-8497-F48AD089473F}" type="datetimeFigureOut">
               <a:rPr kumimoji="1" lang="ja-JP" altLang="en-US" smtClean="0"/>
-              <a:t>2022/12/24</a:t>
+              <a:t>2022/12/25</a:t>
             </a:fld>
             <a:endParaRPr kumimoji="1" lang="ja-JP" altLang="en-US"/>
           </a:p>
@@ -2844,7 +2844,7 @@
           <a:p>
             <a:fld id="{B3DF8FAD-2AB0-4DA8-8497-F48AD089473F}" type="datetimeFigureOut">
               <a:rPr kumimoji="1" lang="ja-JP" altLang="en-US" smtClean="0"/>
-              <a:t>2022/12/24</a:t>
+              <a:t>2022/12/25</a:t>
             </a:fld>
             <a:endParaRPr kumimoji="1" lang="ja-JP" altLang="en-US"/>
           </a:p>
@@ -3101,7 +3101,7 @@
           <a:p>
             <a:fld id="{B3DF8FAD-2AB0-4DA8-8497-F48AD089473F}" type="datetimeFigureOut">
               <a:rPr kumimoji="1" lang="ja-JP" altLang="en-US" smtClean="0"/>
-              <a:t>2022/12/24</a:t>
+              <a:t>2022/12/25</a:t>
             </a:fld>
             <a:endParaRPr kumimoji="1" lang="ja-JP" altLang="en-US"/>
           </a:p>
@@ -3346,7 +3346,7 @@
           <a:p>
             <a:fld id="{B3DF8FAD-2AB0-4DA8-8497-F48AD089473F}" type="datetimeFigureOut">
               <a:rPr kumimoji="1" lang="ja-JP" altLang="en-US" smtClean="0"/>
-              <a:t>2022/12/24</a:t>
+              <a:t>2022/12/25</a:t>
             </a:fld>
             <a:endParaRPr kumimoji="1" lang="ja-JP" altLang="en-US"/>
           </a:p>
@@ -35005,14 +35005,14 @@
           <p:nvPr>
             <p:extLst>
               <p:ext uri="{D42A27DB-BD31-4B8C-83A1-F6EECF244321}">
-                <p14:modId xmlns:p14="http://schemas.microsoft.com/office/powerpoint/2010/main" val="1992943793"/>
+                <p14:modId xmlns:p14="http://schemas.microsoft.com/office/powerpoint/2010/main" val="4018126136"/>
               </p:ext>
             </p:extLst>
           </p:nvPr>
         </p:nvGraphicFramePr>
         <p:xfrm>
           <a:off x="6414837" y="4073733"/>
-          <a:ext cx="4643520" cy="2013986"/>
+          <a:ext cx="4643520" cy="2323830"/>
         </p:xfrm>
         <a:graphic>
           <a:graphicData uri="http://schemas.openxmlformats.org/drawingml/2006/table">
@@ -38900,6 +38900,588 @@
                 <a:extLst>
                   <a:ext uri="{0D108BD9-81ED-4DB2-BD59-A6C34878D82A}">
                     <a16:rowId xmlns:a16="http://schemas.microsoft.com/office/drawing/2014/main" val="2464070035"/>
+                  </a:ext>
+                </a:extLst>
+              </a:tr>
+              <a:tr h="154922">
+                <a:tc>
+                  <a:txBody>
+                    <a:bodyPr/>
+                    <a:lstStyle/>
+                    <a:p>
+                      <a:pPr algn="r" fontAlgn="ctr"/>
+                      <a:r>
+                        <a:rPr lang="en-US" sz="700" b="0" i="0" u="none" strike="noStrike" dirty="0">
+                          <a:solidFill>
+                            <a:srgbClr val="000000"/>
+                          </a:solidFill>
+                          <a:effectLst/>
+                          <a:latin typeface="游ゴシック" panose="020B0400000000000000" pitchFamily="50" charset="-128"/>
+                          <a:ea typeface="游ゴシック" panose="020B0400000000000000" pitchFamily="50" charset="-128"/>
+                        </a:rPr>
+                        <a:t>-</a:t>
+                      </a:r>
+                    </a:p>
+                  </a:txBody>
+                  <a:tcPr marL="6197" marR="6197" marT="6197" marB="0" anchor="ctr">
+                    <a:lnL>
+                      <a:noFill/>
+                    </a:lnL>
+                    <a:lnR>
+                      <a:noFill/>
+                    </a:lnR>
+                    <a:lnT>
+                      <a:noFill/>
+                    </a:lnT>
+                    <a:lnB>
+                      <a:noFill/>
+                    </a:lnB>
+                  </a:tcPr>
+                </a:tc>
+                <a:tc>
+                  <a:txBody>
+                    <a:bodyPr/>
+                    <a:lstStyle/>
+                    <a:p>
+                      <a:pPr algn="r" fontAlgn="ctr"/>
+                      <a:r>
+                        <a:rPr lang="en-US" sz="700" b="0" i="0" u="none" strike="noStrike" dirty="0">
+                          <a:solidFill>
+                            <a:srgbClr val="000000"/>
+                          </a:solidFill>
+                          <a:effectLst/>
+                          <a:latin typeface="游ゴシック" panose="020B0400000000000000" pitchFamily="50" charset="-128"/>
+                          <a:ea typeface="游ゴシック" panose="020B0400000000000000" pitchFamily="50" charset="-128"/>
+                        </a:rPr>
+                        <a:t>-</a:t>
+                      </a:r>
+                    </a:p>
+                  </a:txBody>
+                  <a:tcPr marL="6197" marR="6197" marT="6197" marB="0" anchor="ctr">
+                    <a:lnL>
+                      <a:noFill/>
+                    </a:lnL>
+                    <a:lnR>
+                      <a:noFill/>
+                    </a:lnR>
+                    <a:lnT>
+                      <a:noFill/>
+                    </a:lnT>
+                    <a:lnB>
+                      <a:noFill/>
+                    </a:lnB>
+                  </a:tcPr>
+                </a:tc>
+                <a:tc>
+                  <a:txBody>
+                    <a:bodyPr/>
+                    <a:lstStyle/>
+                    <a:p>
+                      <a:pPr algn="r" fontAlgn="ctr"/>
+                      <a:r>
+                        <a:rPr lang="en-US" altLang="ja-JP" sz="700" b="0" i="0" u="none" strike="noStrike" dirty="0">
+                          <a:solidFill>
+                            <a:srgbClr val="000000"/>
+                          </a:solidFill>
+                          <a:effectLst/>
+                          <a:latin typeface="游ゴシック" panose="020B0400000000000000" pitchFamily="50" charset="-128"/>
+                          <a:ea typeface="游ゴシック" panose="020B0400000000000000" pitchFamily="50" charset="-128"/>
+                        </a:rPr>
+                        <a:t>-</a:t>
+                      </a:r>
+                    </a:p>
+                  </a:txBody>
+                  <a:tcPr marL="6197" marR="6197" marT="6197" marB="0" anchor="ctr">
+                    <a:lnL>
+                      <a:noFill/>
+                    </a:lnL>
+                    <a:lnR>
+                      <a:noFill/>
+                    </a:lnR>
+                    <a:lnT>
+                      <a:noFill/>
+                    </a:lnT>
+                    <a:lnB>
+                      <a:noFill/>
+                    </a:lnB>
+                  </a:tcPr>
+                </a:tc>
+                <a:tc>
+                  <a:txBody>
+                    <a:bodyPr/>
+                    <a:lstStyle/>
+                    <a:p>
+                      <a:pPr algn="r" fontAlgn="ctr"/>
+                      <a:r>
+                        <a:rPr lang="en-US" altLang="ja-JP" sz="700" b="0" i="0" u="none" strike="noStrike" dirty="0">
+                          <a:solidFill>
+                            <a:srgbClr val="000000"/>
+                          </a:solidFill>
+                          <a:effectLst/>
+                          <a:latin typeface="游ゴシック" panose="020B0400000000000000" pitchFamily="50" charset="-128"/>
+                          <a:ea typeface="游ゴシック" panose="020B0400000000000000" pitchFamily="50" charset="-128"/>
+                        </a:rPr>
+                        <a:t>-</a:t>
+                      </a:r>
+                    </a:p>
+                  </a:txBody>
+                  <a:tcPr marL="6197" marR="6197" marT="6197" marB="0" anchor="ctr">
+                    <a:lnL>
+                      <a:noFill/>
+                    </a:lnL>
+                    <a:lnR>
+                      <a:noFill/>
+                    </a:lnR>
+                    <a:lnT>
+                      <a:noFill/>
+                    </a:lnT>
+                    <a:lnB>
+                      <a:noFill/>
+                    </a:lnB>
+                  </a:tcPr>
+                </a:tc>
+                <a:tc>
+                  <a:txBody>
+                    <a:bodyPr/>
+                    <a:lstStyle/>
+                    <a:p>
+                      <a:pPr algn="r" fontAlgn="ctr"/>
+                      <a:r>
+                        <a:rPr lang="en-US" altLang="ja-JP" sz="700" b="0" i="0" u="none" strike="noStrike" dirty="0">
+                          <a:solidFill>
+                            <a:srgbClr val="000000"/>
+                          </a:solidFill>
+                          <a:effectLst/>
+                          <a:latin typeface="游ゴシック" panose="020B0400000000000000" pitchFamily="50" charset="-128"/>
+                          <a:ea typeface="游ゴシック" panose="020B0400000000000000" pitchFamily="50" charset="-128"/>
+                        </a:rPr>
+                        <a:t>-</a:t>
+                      </a:r>
+                    </a:p>
+                  </a:txBody>
+                  <a:tcPr marL="6197" marR="6197" marT="6197" marB="0" anchor="ctr">
+                    <a:lnL>
+                      <a:noFill/>
+                    </a:lnL>
+                    <a:lnR>
+                      <a:noFill/>
+                    </a:lnR>
+                    <a:lnT>
+                      <a:noFill/>
+                    </a:lnT>
+                    <a:lnB>
+                      <a:noFill/>
+                    </a:lnB>
+                  </a:tcPr>
+                </a:tc>
+                <a:tc>
+                  <a:txBody>
+                    <a:bodyPr/>
+                    <a:lstStyle/>
+                    <a:p>
+                      <a:pPr algn="r" fontAlgn="ctr"/>
+                      <a:r>
+                        <a:rPr lang="en-US" altLang="ja-JP" sz="700" b="0" i="0" u="none" strike="noStrike" dirty="0">
+                          <a:solidFill>
+                            <a:srgbClr val="000000"/>
+                          </a:solidFill>
+                          <a:effectLst/>
+                          <a:latin typeface="游ゴシック" panose="020B0400000000000000" pitchFamily="50" charset="-128"/>
+                          <a:ea typeface="游ゴシック" panose="020B0400000000000000" pitchFamily="50" charset="-128"/>
+                        </a:rPr>
+                        <a:t>-</a:t>
+                      </a:r>
+                    </a:p>
+                  </a:txBody>
+                  <a:tcPr marL="6197" marR="6197" marT="6197" marB="0" anchor="ctr">
+                    <a:lnL>
+                      <a:noFill/>
+                    </a:lnL>
+                    <a:lnR>
+                      <a:noFill/>
+                    </a:lnR>
+                    <a:lnT>
+                      <a:noFill/>
+                    </a:lnT>
+                    <a:lnB>
+                      <a:noFill/>
+                    </a:lnB>
+                  </a:tcPr>
+                </a:tc>
+                <a:tc>
+                  <a:txBody>
+                    <a:bodyPr/>
+                    <a:lstStyle/>
+                    <a:p>
+                      <a:pPr algn="r" fontAlgn="ctr"/>
+                      <a:r>
+                        <a:rPr lang="en-US" altLang="ja-JP" sz="700" b="0" i="0" u="none" strike="noStrike" dirty="0">
+                          <a:solidFill>
+                            <a:srgbClr val="000000"/>
+                          </a:solidFill>
+                          <a:effectLst/>
+                          <a:latin typeface="游ゴシック" panose="020B0400000000000000" pitchFamily="50" charset="-128"/>
+                          <a:ea typeface="游ゴシック" panose="020B0400000000000000" pitchFamily="50" charset="-128"/>
+                        </a:rPr>
+                        <a:t>-</a:t>
+                      </a:r>
+                      <a:endParaRPr lang="ja-JP" altLang="en-US" sz="700" b="0" i="0" u="none" strike="noStrike" dirty="0">
+                        <a:solidFill>
+                          <a:srgbClr val="000000"/>
+                        </a:solidFill>
+                        <a:effectLst/>
+                        <a:latin typeface="游ゴシック" panose="020B0400000000000000" pitchFamily="50" charset="-128"/>
+                        <a:ea typeface="游ゴシック" panose="020B0400000000000000" pitchFamily="50" charset="-128"/>
+                      </a:endParaRPr>
+                    </a:p>
+                  </a:txBody>
+                  <a:tcPr marL="6197" marR="6197" marT="6197" marB="0" anchor="ctr">
+                    <a:lnL>
+                      <a:noFill/>
+                    </a:lnL>
+                    <a:lnR>
+                      <a:noFill/>
+                    </a:lnR>
+                    <a:lnT>
+                      <a:noFill/>
+                    </a:lnT>
+                    <a:lnB>
+                      <a:noFill/>
+                    </a:lnB>
+                  </a:tcPr>
+                </a:tc>
+                <a:tc>
+                  <a:txBody>
+                    <a:bodyPr/>
+                    <a:lstStyle/>
+                    <a:p>
+                      <a:pPr algn="r" fontAlgn="ctr"/>
+                      <a:r>
+                        <a:rPr lang="en-US" sz="700" b="0" i="0" u="none" strike="noStrike" dirty="0">
+                          <a:solidFill>
+                            <a:srgbClr val="000000"/>
+                          </a:solidFill>
+                          <a:effectLst/>
+                          <a:latin typeface="游ゴシック" panose="020B0400000000000000" pitchFamily="50" charset="-128"/>
+                          <a:ea typeface="游ゴシック" panose="020B0400000000000000" pitchFamily="50" charset="-128"/>
+                        </a:rPr>
+                        <a:t>-</a:t>
+                      </a:r>
+                    </a:p>
+                  </a:txBody>
+                  <a:tcPr marL="6197" marR="6197" marT="6197" marB="0" anchor="ctr">
+                    <a:lnL>
+                      <a:noFill/>
+                    </a:lnL>
+                    <a:lnR>
+                      <a:noFill/>
+                    </a:lnR>
+                    <a:lnT>
+                      <a:noFill/>
+                    </a:lnT>
+                    <a:lnB>
+                      <a:noFill/>
+                    </a:lnB>
+                  </a:tcPr>
+                </a:tc>
+                <a:extLst>
+                  <a:ext uri="{0D108BD9-81ED-4DB2-BD59-A6C34878D82A}">
+                    <a16:rowId xmlns:a16="http://schemas.microsoft.com/office/drawing/2014/main" val="3902445938"/>
+                  </a:ext>
+                </a:extLst>
+              </a:tr>
+              <a:tr h="154922">
+                <a:tc>
+                  <a:txBody>
+                    <a:bodyPr/>
+                    <a:lstStyle/>
+                    <a:p>
+                      <a:pPr algn="r" fontAlgn="ctr"/>
+                      <a:r>
+                        <a:rPr lang="en-US" sz="700" b="0" i="0" u="none" strike="noStrike" dirty="0">
+                          <a:solidFill>
+                            <a:srgbClr val="000000"/>
+                          </a:solidFill>
+                          <a:effectLst/>
+                          <a:latin typeface="游ゴシック" panose="020B0400000000000000" pitchFamily="50" charset="-128"/>
+                          <a:ea typeface="游ゴシック" panose="020B0400000000000000" pitchFamily="50" charset="-128"/>
+                        </a:rPr>
+                        <a:t>-</a:t>
+                      </a:r>
+                    </a:p>
+                  </a:txBody>
+                  <a:tcPr marL="6197" marR="6197" marT="6197" marB="0" anchor="ctr">
+                    <a:lnL>
+                      <a:noFill/>
+                    </a:lnL>
+                    <a:lnR>
+                      <a:noFill/>
+                    </a:lnR>
+                    <a:lnT>
+                      <a:noFill/>
+                    </a:lnT>
+                    <a:lnB>
+                      <a:noFill/>
+                    </a:lnB>
+                  </a:tcPr>
+                </a:tc>
+                <a:tc>
+                  <a:txBody>
+                    <a:bodyPr/>
+                    <a:lstStyle/>
+                    <a:p>
+                      <a:pPr algn="r" fontAlgn="ctr"/>
+                      <a:r>
+                        <a:rPr lang="en-US" sz="700" b="0" i="0" u="none" strike="noStrike" dirty="0">
+                          <a:solidFill>
+                            <a:srgbClr val="000000"/>
+                          </a:solidFill>
+                          <a:effectLst/>
+                          <a:latin typeface="游ゴシック" panose="020B0400000000000000" pitchFamily="50" charset="-128"/>
+                          <a:ea typeface="游ゴシック" panose="020B0400000000000000" pitchFamily="50" charset="-128"/>
+                        </a:rPr>
+                        <a:t>-</a:t>
+                      </a:r>
+                    </a:p>
+                  </a:txBody>
+                  <a:tcPr marL="6197" marR="6197" marT="6197" marB="0" anchor="ctr">
+                    <a:lnL>
+                      <a:noFill/>
+                    </a:lnL>
+                    <a:lnR>
+                      <a:noFill/>
+                    </a:lnR>
+                    <a:lnT>
+                      <a:noFill/>
+                    </a:lnT>
+                    <a:lnB>
+                      <a:noFill/>
+                    </a:lnB>
+                  </a:tcPr>
+                </a:tc>
+                <a:tc>
+                  <a:txBody>
+                    <a:bodyPr/>
+                    <a:lstStyle/>
+                    <a:p>
+                      <a:pPr algn="r" fontAlgn="ctr"/>
+                      <a:r>
+                        <a:rPr lang="en-US" altLang="ja-JP" sz="700" b="0" i="0" u="none" strike="noStrike" dirty="0">
+                          <a:solidFill>
+                            <a:srgbClr val="000000"/>
+                          </a:solidFill>
+                          <a:effectLst/>
+                          <a:latin typeface="游ゴシック" panose="020B0400000000000000" pitchFamily="50" charset="-128"/>
+                          <a:ea typeface="游ゴシック" panose="020B0400000000000000" pitchFamily="50" charset="-128"/>
+                        </a:rPr>
+                        <a:t>-</a:t>
+                      </a:r>
+                    </a:p>
+                  </a:txBody>
+                  <a:tcPr marL="6197" marR="6197" marT="6197" marB="0" anchor="ctr">
+                    <a:lnL>
+                      <a:noFill/>
+                    </a:lnL>
+                    <a:lnR>
+                      <a:noFill/>
+                    </a:lnR>
+                    <a:lnT>
+                      <a:noFill/>
+                    </a:lnT>
+                    <a:lnB>
+                      <a:noFill/>
+                    </a:lnB>
+                  </a:tcPr>
+                </a:tc>
+                <a:tc>
+                  <a:txBody>
+                    <a:bodyPr/>
+                    <a:lstStyle/>
+                    <a:p>
+                      <a:pPr algn="r" fontAlgn="ctr"/>
+                      <a:r>
+                        <a:rPr lang="en-US" altLang="ja-JP" sz="700" b="0" i="0" u="none" strike="noStrike" dirty="0">
+                          <a:solidFill>
+                            <a:srgbClr val="000000"/>
+                          </a:solidFill>
+                          <a:effectLst/>
+                          <a:latin typeface="游ゴシック" panose="020B0400000000000000" pitchFamily="50" charset="-128"/>
+                          <a:ea typeface="游ゴシック" panose="020B0400000000000000" pitchFamily="50" charset="-128"/>
+                        </a:rPr>
+                        <a:t>-</a:t>
+                      </a:r>
+                    </a:p>
+                  </a:txBody>
+                  <a:tcPr marL="6197" marR="6197" marT="6197" marB="0" anchor="ctr">
+                    <a:lnL>
+                      <a:noFill/>
+                    </a:lnL>
+                    <a:lnR>
+                      <a:noFill/>
+                    </a:lnR>
+                    <a:lnT>
+                      <a:noFill/>
+                    </a:lnT>
+                    <a:lnB>
+                      <a:noFill/>
+                    </a:lnB>
+                  </a:tcPr>
+                </a:tc>
+                <a:tc>
+                  <a:txBody>
+                    <a:bodyPr/>
+                    <a:lstStyle/>
+                    <a:p>
+                      <a:pPr algn="r" fontAlgn="ctr"/>
+                      <a:r>
+                        <a:rPr lang="en-US" altLang="ja-JP" sz="700" b="0" i="0" u="none" strike="noStrike" dirty="0">
+                          <a:solidFill>
+                            <a:srgbClr val="000000"/>
+                          </a:solidFill>
+                          <a:effectLst/>
+                          <a:latin typeface="游ゴシック" panose="020B0400000000000000" pitchFamily="50" charset="-128"/>
+                          <a:ea typeface="游ゴシック" panose="020B0400000000000000" pitchFamily="50" charset="-128"/>
+                        </a:rPr>
+                        <a:t>-</a:t>
+                      </a:r>
+                    </a:p>
+                  </a:txBody>
+                  <a:tcPr marL="6197" marR="6197" marT="6197" marB="0" anchor="ctr">
+                    <a:lnL>
+                      <a:noFill/>
+                    </a:lnL>
+                    <a:lnR>
+                      <a:noFill/>
+                    </a:lnR>
+                    <a:lnT>
+                      <a:noFill/>
+                    </a:lnT>
+                    <a:lnB>
+                      <a:noFill/>
+                    </a:lnB>
+                  </a:tcPr>
+                </a:tc>
+                <a:tc>
+                  <a:txBody>
+                    <a:bodyPr/>
+                    <a:lstStyle/>
+                    <a:p>
+                      <a:pPr algn="r" fontAlgn="ctr"/>
+                      <a:r>
+                        <a:rPr lang="en-US" altLang="ja-JP" sz="700" b="0" i="0" u="none" strike="noStrike" dirty="0">
+                          <a:solidFill>
+                            <a:srgbClr val="000000"/>
+                          </a:solidFill>
+                          <a:effectLst/>
+                          <a:latin typeface="游ゴシック" panose="020B0400000000000000" pitchFamily="50" charset="-128"/>
+                          <a:ea typeface="游ゴシック" panose="020B0400000000000000" pitchFamily="50" charset="-128"/>
+                        </a:rPr>
+                        <a:t>-</a:t>
+                      </a:r>
+                    </a:p>
+                  </a:txBody>
+                  <a:tcPr marL="6197" marR="6197" marT="6197" marB="0" anchor="ctr">
+                    <a:lnL>
+                      <a:noFill/>
+                    </a:lnL>
+                    <a:lnR>
+                      <a:noFill/>
+                    </a:lnR>
+                    <a:lnT>
+                      <a:noFill/>
+                    </a:lnT>
+                    <a:lnB>
+                      <a:noFill/>
+                    </a:lnB>
+                  </a:tcPr>
+                </a:tc>
+                <a:tc>
+                  <a:txBody>
+                    <a:bodyPr/>
+                    <a:lstStyle/>
+                    <a:p>
+                      <a:pPr algn="r" fontAlgn="ctr"/>
+                      <a:r>
+                        <a:rPr lang="en-US" altLang="ja-JP" sz="700" b="0" i="0" u="none" strike="noStrike" dirty="0">
+                          <a:solidFill>
+                            <a:srgbClr val="000000"/>
+                          </a:solidFill>
+                          <a:effectLst/>
+                          <a:latin typeface="游ゴシック" panose="020B0400000000000000" pitchFamily="50" charset="-128"/>
+                          <a:ea typeface="游ゴシック" panose="020B0400000000000000" pitchFamily="50" charset="-128"/>
+                        </a:rPr>
+                        <a:t>-</a:t>
+                      </a:r>
+                      <a:endParaRPr lang="ja-JP" altLang="en-US" sz="700" b="0" i="0" u="none" strike="noStrike" dirty="0">
+                        <a:solidFill>
+                          <a:srgbClr val="000000"/>
+                        </a:solidFill>
+                        <a:effectLst/>
+                        <a:latin typeface="游ゴシック" panose="020B0400000000000000" pitchFamily="50" charset="-128"/>
+                        <a:ea typeface="游ゴシック" panose="020B0400000000000000" pitchFamily="50" charset="-128"/>
+                      </a:endParaRPr>
+                    </a:p>
+                  </a:txBody>
+                  <a:tcPr marL="6197" marR="6197" marT="6197" marB="0" anchor="ctr">
+                    <a:lnL>
+                      <a:noFill/>
+                    </a:lnL>
+                    <a:lnR>
+                      <a:noFill/>
+                    </a:lnR>
+                    <a:lnT>
+                      <a:noFill/>
+                    </a:lnT>
+                    <a:lnB>
+                      <a:noFill/>
+                    </a:lnB>
+                  </a:tcPr>
+                </a:tc>
+                <a:tc>
+                  <a:txBody>
+                    <a:bodyPr/>
+                    <a:lstStyle/>
+                    <a:p>
+                      <a:pPr algn="r" fontAlgn="ctr"/>
+                      <a:r>
+                        <a:rPr lang="en-US" sz="700" b="0" i="0" u="none" strike="noStrike">
+                          <a:solidFill>
+                            <a:srgbClr val="000000"/>
+                          </a:solidFill>
+                          <a:effectLst/>
+                          <a:latin typeface="游ゴシック" panose="020B0400000000000000" pitchFamily="50" charset="-128"/>
+                          <a:ea typeface="游ゴシック" panose="020B0400000000000000" pitchFamily="50" charset="-128"/>
+                        </a:rPr>
+                        <a:t>-</a:t>
+                      </a:r>
+                      <a:endParaRPr lang="en-US" sz="700" b="0" i="0" u="none" strike="noStrike" dirty="0">
+                        <a:solidFill>
+                          <a:srgbClr val="000000"/>
+                        </a:solidFill>
+                        <a:effectLst/>
+                        <a:latin typeface="游ゴシック" panose="020B0400000000000000" pitchFamily="50" charset="-128"/>
+                        <a:ea typeface="游ゴシック" panose="020B0400000000000000" pitchFamily="50" charset="-128"/>
+                      </a:endParaRPr>
+                    </a:p>
+                  </a:txBody>
+                  <a:tcPr marL="6197" marR="6197" marT="6197" marB="0" anchor="ctr">
+                    <a:lnL>
+                      <a:noFill/>
+                    </a:lnL>
+                    <a:lnR>
+                      <a:noFill/>
+                    </a:lnR>
+                    <a:lnT>
+                      <a:noFill/>
+                    </a:lnT>
+                    <a:lnB>
+                      <a:noFill/>
+                    </a:lnB>
+                  </a:tcPr>
+                </a:tc>
+                <a:extLst>
+                  <a:ext uri="{0D108BD9-81ED-4DB2-BD59-A6C34878D82A}">
+                    <a16:rowId xmlns:a16="http://schemas.microsoft.com/office/drawing/2014/main" val="1746050471"/>
                   </a:ext>
                 </a:extLst>
               </a:tr>

</xml_diff>

<commit_message>
UPD: summary slide layout update
</commit_message>
<xml_diff>
--- a/faster2lib/EEG_power_specrum_template.pptx
+++ b/faster2lib/EEG_power_specrum_template.pptx
@@ -202,7 +202,7 @@
           <a:p>
             <a:fld id="{659F289F-6C09-4E41-AB64-F4FBAF604A8F}" type="datetimeFigureOut">
               <a:rPr kumimoji="1" lang="ja-JP" altLang="en-US" smtClean="0"/>
-              <a:t>2022/12/25</a:t>
+              <a:t>2023/5/27</a:t>
             </a:fld>
             <a:endParaRPr kumimoji="1" lang="ja-JP" altLang="en-US"/>
           </a:p>
@@ -733,7 +733,7 @@
           <a:p>
             <a:fld id="{B3DF8FAD-2AB0-4DA8-8497-F48AD089473F}" type="datetimeFigureOut">
               <a:rPr kumimoji="1" lang="ja-JP" altLang="en-US" smtClean="0"/>
-              <a:t>2022/12/25</a:t>
+              <a:t>2023/5/27</a:t>
             </a:fld>
             <a:endParaRPr kumimoji="1" lang="ja-JP" altLang="en-US"/>
           </a:p>
@@ -935,7 +935,7 @@
           <a:p>
             <a:fld id="{B3DF8FAD-2AB0-4DA8-8497-F48AD089473F}" type="datetimeFigureOut">
               <a:rPr kumimoji="1" lang="ja-JP" altLang="en-US" smtClean="0"/>
-              <a:t>2022/12/25</a:t>
+              <a:t>2023/5/27</a:t>
             </a:fld>
             <a:endParaRPr kumimoji="1" lang="ja-JP" altLang="en-US"/>
           </a:p>
@@ -1147,7 +1147,7 @@
           <a:p>
             <a:fld id="{B3DF8FAD-2AB0-4DA8-8497-F48AD089473F}" type="datetimeFigureOut">
               <a:rPr kumimoji="1" lang="ja-JP" altLang="en-US" smtClean="0"/>
-              <a:t>2022/12/25</a:t>
+              <a:t>2023/5/27</a:t>
             </a:fld>
             <a:endParaRPr kumimoji="1" lang="ja-JP" altLang="en-US"/>
           </a:p>
@@ -1349,7 +1349,7 @@
           <a:p>
             <a:fld id="{B3DF8FAD-2AB0-4DA8-8497-F48AD089473F}" type="datetimeFigureOut">
               <a:rPr kumimoji="1" lang="ja-JP" altLang="en-US" smtClean="0"/>
-              <a:t>2022/12/25</a:t>
+              <a:t>2023/5/27</a:t>
             </a:fld>
             <a:endParaRPr kumimoji="1" lang="ja-JP" altLang="en-US"/>
           </a:p>
@@ -1595,7 +1595,7 @@
           <a:p>
             <a:fld id="{B3DF8FAD-2AB0-4DA8-8497-F48AD089473F}" type="datetimeFigureOut">
               <a:rPr kumimoji="1" lang="ja-JP" altLang="en-US" smtClean="0"/>
-              <a:t>2022/12/25</a:t>
+              <a:t>2023/5/27</a:t>
             </a:fld>
             <a:endParaRPr kumimoji="1" lang="ja-JP" altLang="en-US"/>
           </a:p>
@@ -1891,7 +1891,7 @@
           <a:p>
             <a:fld id="{B3DF8FAD-2AB0-4DA8-8497-F48AD089473F}" type="datetimeFigureOut">
               <a:rPr kumimoji="1" lang="ja-JP" altLang="en-US" smtClean="0"/>
-              <a:t>2022/12/25</a:t>
+              <a:t>2023/5/27</a:t>
             </a:fld>
             <a:endParaRPr kumimoji="1" lang="ja-JP" altLang="en-US"/>
           </a:p>
@@ -2322,7 +2322,7 @@
           <a:p>
             <a:fld id="{B3DF8FAD-2AB0-4DA8-8497-F48AD089473F}" type="datetimeFigureOut">
               <a:rPr kumimoji="1" lang="ja-JP" altLang="en-US" smtClean="0"/>
-              <a:t>2022/12/25</a:t>
+              <a:t>2023/5/27</a:t>
             </a:fld>
             <a:endParaRPr kumimoji="1" lang="ja-JP" altLang="en-US"/>
           </a:p>
@@ -2440,7 +2440,7 @@
           <a:p>
             <a:fld id="{B3DF8FAD-2AB0-4DA8-8497-F48AD089473F}" type="datetimeFigureOut">
               <a:rPr kumimoji="1" lang="ja-JP" altLang="en-US" smtClean="0"/>
-              <a:t>2022/12/25</a:t>
+              <a:t>2023/5/27</a:t>
             </a:fld>
             <a:endParaRPr kumimoji="1" lang="ja-JP" altLang="en-US"/>
           </a:p>
@@ -2535,7 +2535,7 @@
           <a:p>
             <a:fld id="{B3DF8FAD-2AB0-4DA8-8497-F48AD089473F}" type="datetimeFigureOut">
               <a:rPr kumimoji="1" lang="ja-JP" altLang="en-US" smtClean="0"/>
-              <a:t>2022/12/25</a:t>
+              <a:t>2023/5/27</a:t>
             </a:fld>
             <a:endParaRPr kumimoji="1" lang="ja-JP" altLang="en-US"/>
           </a:p>
@@ -2844,7 +2844,7 @@
           <a:p>
             <a:fld id="{B3DF8FAD-2AB0-4DA8-8497-F48AD089473F}" type="datetimeFigureOut">
               <a:rPr kumimoji="1" lang="ja-JP" altLang="en-US" smtClean="0"/>
-              <a:t>2022/12/25</a:t>
+              <a:t>2023/5/27</a:t>
             </a:fld>
             <a:endParaRPr kumimoji="1" lang="ja-JP" altLang="en-US"/>
           </a:p>
@@ -3101,7 +3101,7 @@
           <a:p>
             <a:fld id="{B3DF8FAD-2AB0-4DA8-8497-F48AD089473F}" type="datetimeFigureOut">
               <a:rPr kumimoji="1" lang="ja-JP" altLang="en-US" smtClean="0"/>
-              <a:t>2022/12/25</a:t>
+              <a:t>2023/5/27</a:t>
             </a:fld>
             <a:endParaRPr kumimoji="1" lang="ja-JP" altLang="en-US"/>
           </a:p>
@@ -3346,7 +3346,7 @@
           <a:p>
             <a:fld id="{B3DF8FAD-2AB0-4DA8-8497-F48AD089473F}" type="datetimeFigureOut">
               <a:rPr kumimoji="1" lang="ja-JP" altLang="en-US" smtClean="0"/>
-              <a:t>2022/12/25</a:t>
+              <a:t>2023/5/27</a:t>
             </a:fld>
             <a:endParaRPr kumimoji="1" lang="ja-JP" altLang="en-US"/>
           </a:p>
@@ -3766,7 +3766,7 @@
           <p:nvPr>
             <p:extLst>
               <p:ext uri="{D42A27DB-BD31-4B8C-83A1-F6EECF244321}">
-                <p14:modId xmlns:p14="http://schemas.microsoft.com/office/powerpoint/2010/main" val="122560203"/>
+                <p14:modId xmlns:p14="http://schemas.microsoft.com/office/powerpoint/2010/main" val="2491126051"/>
               </p:ext>
             </p:extLst>
           </p:nvPr>
@@ -3780,14 +3780,14 @@
             <a:tbl>
               <a:tblPr/>
               <a:tblGrid>
-                <a:gridCol w="884683">
+                <a:gridCol w="1025375">
                   <a:extLst>
                     <a:ext uri="{9D8B030D-6E8A-4147-A177-3AD203B41FA5}">
                       <a16:colId xmlns:a16="http://schemas.microsoft.com/office/drawing/2014/main" val="3713795776"/>
                     </a:ext>
                   </a:extLst>
                 </a:gridCol>
-                <a:gridCol w="706045">
+                <a:gridCol w="565353">
                   <a:extLst>
                     <a:ext uri="{9D8B030D-6E8A-4147-A177-3AD203B41FA5}">
                       <a16:colId xmlns:a16="http://schemas.microsoft.com/office/drawing/2014/main" val="544720975"/>
@@ -4433,15 +4433,31 @@
                     <a:bodyPr/>
                     <a:lstStyle/>
                     <a:p>
-                      <a:pPr algn="l" fontAlgn="ctr"/>
-                      <a:r>
-                        <a:rPr lang="en-US" sz="700" b="0" i="0" u="none" strike="noStrike" dirty="0">
-                          <a:solidFill>
-                            <a:srgbClr val="000000"/>
-                          </a:solidFill>
-                          <a:effectLst/>
-                          <a:latin typeface="游ゴシック" panose="020B0400000000000000" pitchFamily="50" charset="-128"/>
-                          <a:ea typeface="游ゴシック" panose="020B0400000000000000" pitchFamily="50" charset="-128"/>
+                      <a:pPr marL="0" marR="0" lvl="0" indent="0" algn="l" defTabSz="914400" rtl="0" eaLnBrk="1" fontAlgn="ctr" latinLnBrk="0" hangingPunct="1">
+                        <a:lnSpc>
+                          <a:spcPct val="100000"/>
+                        </a:lnSpc>
+                        <a:spcBef>
+                          <a:spcPts val="0"/>
+                        </a:spcBef>
+                        <a:spcAft>
+                          <a:spcPts val="0"/>
+                        </a:spcAft>
+                        <a:buClrTx/>
+                        <a:buSzTx/>
+                        <a:buFontTx/>
+                        <a:buNone/>
+                        <a:tabLst/>
+                        <a:defRPr/>
+                      </a:pPr>
+                      <a:r>
+                        <a:rPr lang="en-US" altLang="ja-JP" sz="700" b="0" i="0" u="none" strike="noStrike" dirty="0">
+                          <a:solidFill>
+                            <a:srgbClr val="000000"/>
+                          </a:solidFill>
+                          <a:effectLst/>
+                          <a:latin typeface="游ゴシック" panose="020B0400000000000000" pitchFamily="50" charset="-128"/>
+                          <a:ea typeface="+mn-ea"/>
                         </a:rPr>
                         <a:t>-</a:t>
                       </a:r>
@@ -5913,28 +5929,28 @@
           <p:nvPr>
             <p:extLst>
               <p:ext uri="{D42A27DB-BD31-4B8C-83A1-F6EECF244321}">
-                <p14:modId xmlns:p14="http://schemas.microsoft.com/office/powerpoint/2010/main" val="4281866655"/>
+                <p14:modId xmlns:p14="http://schemas.microsoft.com/office/powerpoint/2010/main" val="1936526858"/>
               </p:ext>
             </p:extLst>
           </p:nvPr>
         </p:nvGraphicFramePr>
         <p:xfrm>
           <a:off x="5358989" y="3191743"/>
-          <a:ext cx="4944246" cy="581025"/>
+          <a:ext cx="5244283" cy="581025"/>
         </p:xfrm>
         <a:graphic>
           <a:graphicData uri="http://schemas.openxmlformats.org/drawingml/2006/table">
             <a:tbl>
               <a:tblPr/>
               <a:tblGrid>
-                <a:gridCol w="611188">
+                <a:gridCol w="984661">
                   <a:extLst>
                     <a:ext uri="{9D8B030D-6E8A-4147-A177-3AD203B41FA5}">
                       <a16:colId xmlns:a16="http://schemas.microsoft.com/office/drawing/2014/main" val="1693758350"/>
                     </a:ext>
                   </a:extLst>
                 </a:gridCol>
-                <a:gridCol w="446609">
+                <a:gridCol w="373173">
                   <a:extLst>
                     <a:ext uri="{9D8B030D-6E8A-4147-A177-3AD203B41FA5}">
                       <a16:colId xmlns:a16="http://schemas.microsoft.com/office/drawing/2014/main" val="79885063"/>
@@ -6591,15 +6607,31 @@
                     <a:bodyPr/>
                     <a:lstStyle/>
                     <a:p>
-                      <a:pPr algn="l" fontAlgn="ctr"/>
-                      <a:r>
-                        <a:rPr lang="en-US" sz="700" b="0" i="0" u="none" strike="noStrike" dirty="0">
-                          <a:solidFill>
-                            <a:srgbClr val="000000"/>
-                          </a:solidFill>
-                          <a:effectLst/>
-                          <a:latin typeface="游ゴシック" panose="020B0400000000000000" pitchFamily="50" charset="-128"/>
-                          <a:ea typeface="游ゴシック" panose="020B0400000000000000" pitchFamily="50" charset="-128"/>
+                      <a:pPr marL="0" marR="0" lvl="0" indent="0" algn="l" defTabSz="914400" rtl="0" eaLnBrk="1" fontAlgn="ctr" latinLnBrk="0" hangingPunct="1">
+                        <a:lnSpc>
+                          <a:spcPct val="100000"/>
+                        </a:lnSpc>
+                        <a:spcBef>
+                          <a:spcPts val="0"/>
+                        </a:spcBef>
+                        <a:spcAft>
+                          <a:spcPts val="0"/>
+                        </a:spcAft>
+                        <a:buClrTx/>
+                        <a:buSzTx/>
+                        <a:buFontTx/>
+                        <a:buNone/>
+                        <a:tabLst/>
+                        <a:defRPr/>
+                      </a:pPr>
+                      <a:r>
+                        <a:rPr lang="en-US" altLang="ja-JP" sz="700" b="0" i="0" u="none" strike="noStrike" dirty="0">
+                          <a:solidFill>
+                            <a:srgbClr val="000000"/>
+                          </a:solidFill>
+                          <a:effectLst/>
+                          <a:latin typeface="游ゴシック" panose="020B0400000000000000" pitchFamily="50" charset="-128"/>
+                          <a:ea typeface="+mn-ea"/>
                         </a:rPr>
                         <a:t>-</a:t>
                       </a:r>
@@ -7565,63 +7597,63 @@
           <p:nvPr>
             <p:extLst>
               <p:ext uri="{D42A27DB-BD31-4B8C-83A1-F6EECF244321}">
-                <p14:modId xmlns:p14="http://schemas.microsoft.com/office/powerpoint/2010/main" val="2373992595"/>
+                <p14:modId xmlns:p14="http://schemas.microsoft.com/office/powerpoint/2010/main" val="1366972489"/>
               </p:ext>
             </p:extLst>
           </p:nvPr>
         </p:nvGraphicFramePr>
         <p:xfrm>
           <a:off x="9421091" y="3940511"/>
-          <a:ext cx="2770908" cy="2719951"/>
+          <a:ext cx="2770909" cy="2719951"/>
         </p:xfrm>
         <a:graphic>
           <a:graphicData uri="http://schemas.openxmlformats.org/drawingml/2006/table">
             <a:tbl>
               <a:tblPr/>
               <a:tblGrid>
-                <a:gridCol w="780537">
+                <a:gridCol w="984997">
                   <a:extLst>
                     <a:ext uri="{9D8B030D-6E8A-4147-A177-3AD203B41FA5}">
                       <a16:colId xmlns:a16="http://schemas.microsoft.com/office/drawing/2014/main" val="1392627465"/>
                     </a:ext>
                   </a:extLst>
                 </a:gridCol>
-                <a:gridCol w="288081">
+                <a:gridCol w="261912">
                   <a:extLst>
                     <a:ext uri="{9D8B030D-6E8A-4147-A177-3AD203B41FA5}">
                       <a16:colId xmlns:a16="http://schemas.microsoft.com/office/drawing/2014/main" val="3327564658"/>
                     </a:ext>
                   </a:extLst>
                 </a:gridCol>
-                <a:gridCol w="163457">
+                <a:gridCol w="184150">
                   <a:extLst>
                     <a:ext uri="{9D8B030D-6E8A-4147-A177-3AD203B41FA5}">
                       <a16:colId xmlns:a16="http://schemas.microsoft.com/office/drawing/2014/main" val="1423139776"/>
                     </a:ext>
                   </a:extLst>
                 </a:gridCol>
-                <a:gridCol w="421234">
+                <a:gridCol w="406400">
                   <a:extLst>
                     <a:ext uri="{9D8B030D-6E8A-4147-A177-3AD203B41FA5}">
                       <a16:colId xmlns:a16="http://schemas.microsoft.com/office/drawing/2014/main" val="447136922"/>
                     </a:ext>
                   </a:extLst>
                 </a:gridCol>
-                <a:gridCol w="424873">
+                <a:gridCol w="393700">
                   <a:extLst>
                     <a:ext uri="{9D8B030D-6E8A-4147-A177-3AD203B41FA5}">
                       <a16:colId xmlns:a16="http://schemas.microsoft.com/office/drawing/2014/main" val="2041675413"/>
                     </a:ext>
                   </a:extLst>
                 </a:gridCol>
-                <a:gridCol w="393508">
+                <a:gridCol w="400050">
                   <a:extLst>
                     <a:ext uri="{9D8B030D-6E8A-4147-A177-3AD203B41FA5}">
                       <a16:colId xmlns:a16="http://schemas.microsoft.com/office/drawing/2014/main" val="3512451945"/>
                     </a:ext>
                   </a:extLst>
                 </a:gridCol>
-                <a:gridCol w="299218">
+                <a:gridCol w="139700">
                   <a:extLst>
                     <a:ext uri="{9D8B030D-6E8A-4147-A177-3AD203B41FA5}">
                       <a16:colId xmlns:a16="http://schemas.microsoft.com/office/drawing/2014/main" val="3656572944"/>
@@ -7807,16 +7839,24 @@
                     <a:p>
                       <a:pPr algn="l" fontAlgn="ctr"/>
                       <a:r>
-                        <a:rPr lang="en-US" sz="700" b="1" i="0" u="none" strike="noStrike">
-                          <a:solidFill>
-                            <a:srgbClr val="000000"/>
-                          </a:solidFill>
-                          <a:effectLst/>
-                          <a:latin typeface="游ゴシック" panose="020B0400000000000000" pitchFamily="50" charset="-128"/>
-                          <a:ea typeface="游ゴシック" panose="020B0400000000000000" pitchFamily="50" charset="-128"/>
-                        </a:rPr>
-                        <a:t>Pvalue</a:t>
-                      </a:r>
+                        <a:rPr lang="en-US" sz="700" b="1" i="0" u="none" strike="noStrike" dirty="0" err="1">
+                          <a:solidFill>
+                            <a:srgbClr val="000000"/>
+                          </a:solidFill>
+                          <a:effectLst/>
+                          <a:latin typeface="游ゴシック" panose="020B0400000000000000" pitchFamily="50" charset="-128"/>
+                          <a:ea typeface="游ゴシック" panose="020B0400000000000000" pitchFamily="50" charset="-128"/>
+                        </a:rPr>
+                        <a:t>Pval</a:t>
+                      </a:r>
+                      <a:endParaRPr lang="en-US" sz="700" b="1" i="0" u="none" strike="noStrike" dirty="0">
+                        <a:solidFill>
+                          <a:srgbClr val="000000"/>
+                        </a:solidFill>
+                        <a:effectLst/>
+                        <a:latin typeface="游ゴシック" panose="020B0400000000000000" pitchFamily="50" charset="-128"/>
+                        <a:ea typeface="游ゴシック" panose="020B0400000000000000" pitchFamily="50" charset="-128"/>
+                      </a:endParaRPr>
                     </a:p>
                   </a:txBody>
                   <a:tcPr marL="8637" marR="8637" marT="8637" marB="0" anchor="ctr">
@@ -7841,15 +7881,15 @@
                     <a:p>
                       <a:pPr algn="l" fontAlgn="ctr"/>
                       <a:r>
-                        <a:rPr lang="en-US" sz="700" b="1" i="0" u="none" strike="noStrike">
-                          <a:solidFill>
-                            <a:srgbClr val="000000"/>
-                          </a:solidFill>
-                          <a:effectLst/>
-                          <a:latin typeface="游ゴシック" panose="020B0400000000000000" pitchFamily="50" charset="-128"/>
-                          <a:ea typeface="游ゴシック" panose="020B0400000000000000" pitchFamily="50" charset="-128"/>
-                        </a:rPr>
-                        <a:t>Stars</a:t>
+                        <a:rPr lang="en-US" sz="700" b="1" i="0" u="none" strike="noStrike" dirty="0">
+                          <a:solidFill>
+                            <a:srgbClr val="000000"/>
+                          </a:solidFill>
+                          <a:effectLst/>
+                          <a:latin typeface="游ゴシック" panose="020B0400000000000000" pitchFamily="50" charset="-128"/>
+                          <a:ea typeface="游ゴシック" panose="020B0400000000000000" pitchFamily="50" charset="-128"/>
+                        </a:rPr>
+                        <a:t>*</a:t>
                       </a:r>
                     </a:p>
                   </a:txBody>
@@ -8127,13 +8167,13 @@
                     <a:p>
                       <a:pPr algn="l" fontAlgn="ctr"/>
                       <a:r>
-                        <a:rPr lang="en-US" sz="700" b="0" i="0" u="none" strike="noStrike" dirty="0">
-                          <a:solidFill>
-                            <a:srgbClr val="000000"/>
-                          </a:solidFill>
-                          <a:effectLst/>
-                          <a:latin typeface="游ゴシック" panose="020B0400000000000000" pitchFamily="50" charset="-128"/>
-                          <a:ea typeface="游ゴシック" panose="020B0400000000000000" pitchFamily="50" charset="-128"/>
+                        <a:rPr lang="en-US" altLang="ja-JP" sz="700" b="0" i="0" u="none" strike="noStrike" dirty="0">
+                          <a:solidFill>
+                            <a:srgbClr val="000000"/>
+                          </a:solidFill>
+                          <a:effectLst/>
+                          <a:latin typeface="游ゴシック" panose="020B0400000000000000" pitchFamily="50" charset="-128"/>
+                          <a:ea typeface="+mn-ea"/>
                         </a:rPr>
                         <a:t>-</a:t>
                       </a:r>
@@ -35005,21 +35045,21 @@
           <p:nvPr>
             <p:extLst>
               <p:ext uri="{D42A27DB-BD31-4B8C-83A1-F6EECF244321}">
-                <p14:modId xmlns:p14="http://schemas.microsoft.com/office/powerpoint/2010/main" val="4018126136"/>
+                <p14:modId xmlns:p14="http://schemas.microsoft.com/office/powerpoint/2010/main" val="2912388290"/>
               </p:ext>
             </p:extLst>
           </p:nvPr>
         </p:nvGraphicFramePr>
         <p:xfrm>
-          <a:off x="6414837" y="4073733"/>
-          <a:ext cx="4643520" cy="2323830"/>
+          <a:off x="6414837" y="3009600"/>
+          <a:ext cx="4903901" cy="1856940"/>
         </p:xfrm>
         <a:graphic>
           <a:graphicData uri="http://schemas.openxmlformats.org/drawingml/2006/table">
             <a:tbl>
               <a:tblPr/>
               <a:tblGrid>
-                <a:gridCol w="644188">
+                <a:gridCol w="904569">
                   <a:extLst>
                     <a:ext uri="{9D8B030D-6E8A-4147-A177-3AD203B41FA5}">
                       <a16:colId xmlns:a16="http://schemas.microsoft.com/office/drawing/2014/main" val="4115591681"/>
@@ -35076,7 +35116,7 @@
                   </a:extLst>
                 </a:gridCol>
               </a:tblGrid>
-              <a:tr h="154922">
+              <a:tr h="123796">
                 <a:tc>
                   <a:txBody>
                     <a:bodyPr/>
@@ -35363,7 +35403,7 @@
                   </a:ext>
                 </a:extLst>
               </a:tr>
-              <a:tr h="154922">
+              <a:tr h="123796">
                 <a:tc>
                   <a:txBody>
                     <a:bodyPr/>
@@ -35666,7 +35706,7 @@
                   </a:ext>
                 </a:extLst>
               </a:tr>
-              <a:tr h="154922">
+              <a:tr h="123796">
                 <a:tc>
                   <a:txBody>
                     <a:bodyPr/>
@@ -35936,7 +35976,7 @@
                           <a:latin typeface="游ゴシック" panose="020B0400000000000000" pitchFamily="50" charset="-128"/>
                           <a:ea typeface="游ゴシック" panose="020B0400000000000000" pitchFamily="50" charset="-128"/>
                         </a:rPr>
-                        <a:t>-</a:t>
+                        <a:t>- </a:t>
                       </a:r>
                       <a:endParaRPr lang="ja-JP" altLang="en-US" sz="700" b="0" i="0" u="none" strike="noStrike" dirty="0">
                         <a:solidFill>
@@ -35969,7 +36009,7 @@
                   </a:ext>
                 </a:extLst>
               </a:tr>
-              <a:tr h="154922">
+              <a:tr h="123796">
                 <a:tc>
                   <a:txBody>
                     <a:bodyPr/>
@@ -36272,7 +36312,7 @@
                   </a:ext>
                 </a:extLst>
               </a:tr>
-              <a:tr h="154922">
+              <a:tr h="123796">
                 <a:tc>
                   <a:txBody>
                     <a:bodyPr/>
@@ -36575,7 +36615,7 @@
                   </a:ext>
                 </a:extLst>
               </a:tr>
-              <a:tr h="154922">
+              <a:tr h="123796">
                 <a:tc>
                   <a:txBody>
                     <a:bodyPr/>
@@ -36878,7 +36918,7 @@
                   </a:ext>
                 </a:extLst>
               </a:tr>
-              <a:tr h="154922">
+              <a:tr h="123796">
                 <a:tc>
                   <a:txBody>
                     <a:bodyPr/>
@@ -37181,7 +37221,7 @@
                   </a:ext>
                 </a:extLst>
               </a:tr>
-              <a:tr h="154922">
+              <a:tr h="123796">
                 <a:tc>
                   <a:txBody>
                     <a:bodyPr/>
@@ -37468,7 +37508,7 @@
                   </a:ext>
                 </a:extLst>
               </a:tr>
-              <a:tr h="154922">
+              <a:tr h="123796">
                 <a:tc>
                   <a:txBody>
                     <a:bodyPr/>
@@ -37755,7 +37795,7 @@
                   </a:ext>
                 </a:extLst>
               </a:tr>
-              <a:tr h="154922">
+              <a:tr h="123796">
                 <a:tc>
                   <a:txBody>
                     <a:bodyPr/>
@@ -38042,7 +38082,7 @@
                   </a:ext>
                 </a:extLst>
               </a:tr>
-              <a:tr h="154922">
+              <a:tr h="123796">
                 <a:tc>
                   <a:txBody>
                     <a:bodyPr/>
@@ -38329,7 +38369,7 @@
                   </a:ext>
                 </a:extLst>
               </a:tr>
-              <a:tr h="154922">
+              <a:tr h="123796">
                 <a:tc>
                   <a:txBody>
                     <a:bodyPr/>
@@ -38616,7 +38656,7 @@
                   </a:ext>
                 </a:extLst>
               </a:tr>
-              <a:tr h="154922">
+              <a:tr h="123796">
                 <a:tc>
                   <a:txBody>
                     <a:bodyPr/>
@@ -38903,7 +38943,7 @@
                   </a:ext>
                 </a:extLst>
               </a:tr>
-              <a:tr h="154922">
+              <a:tr h="123796">
                 <a:tc>
                   <a:txBody>
                     <a:bodyPr/>
@@ -39190,7 +39230,7 @@
                   </a:ext>
                 </a:extLst>
               </a:tr>
-              <a:tr h="154922">
+              <a:tr h="123796">
                 <a:tc>
                   <a:txBody>
                     <a:bodyPr/>
@@ -39444,24 +39484,16 @@
                     <a:p>
                       <a:pPr algn="r" fontAlgn="ctr"/>
                       <a:r>
-                        <a:rPr lang="en-US" sz="700" b="0" i="0" u="none" strike="noStrike">
-                          <a:solidFill>
-                            <a:srgbClr val="000000"/>
-                          </a:solidFill>
-                          <a:effectLst/>
-                          <a:latin typeface="游ゴシック" panose="020B0400000000000000" pitchFamily="50" charset="-128"/>
-                          <a:ea typeface="游ゴシック" panose="020B0400000000000000" pitchFamily="50" charset="-128"/>
-                        </a:rPr>
-                        <a:t>-</a:t>
-                      </a:r>
-                      <a:endParaRPr lang="en-US" sz="700" b="0" i="0" u="none" strike="noStrike" dirty="0">
-                        <a:solidFill>
-                          <a:srgbClr val="000000"/>
-                        </a:solidFill>
-                        <a:effectLst/>
-                        <a:latin typeface="游ゴシック" panose="020B0400000000000000" pitchFamily="50" charset="-128"/>
-                        <a:ea typeface="游ゴシック" panose="020B0400000000000000" pitchFamily="50" charset="-128"/>
-                      </a:endParaRPr>
+                        <a:rPr lang="en-US" sz="700" b="0" i="0" u="none" strike="noStrike" dirty="0">
+                          <a:solidFill>
+                            <a:srgbClr val="000000"/>
+                          </a:solidFill>
+                          <a:effectLst/>
+                          <a:latin typeface="游ゴシック" panose="020B0400000000000000" pitchFamily="50" charset="-128"/>
+                          <a:ea typeface="游ゴシック" panose="020B0400000000000000" pitchFamily="50" charset="-128"/>
+                        </a:rPr>
+                        <a:t>-</a:t>
+                      </a:r>
                     </a:p>
                   </a:txBody>
                   <a:tcPr marL="6197" marR="6197" marT="6197" marB="0" anchor="ctr">

</xml_diff>

<commit_message>
[UPD] added spindle summary to the slide
</commit_message>
<xml_diff>
--- a/faster2lib/EEG_power_specrum_template.pptx
+++ b/faster2lib/EEG_power_specrum_template.pptx
@@ -5,7 +5,7 @@
     <p:sldMasterId id="2147483660" r:id="rId1"/>
   </p:sldMasterIdLst>
   <p:notesMasterIdLst>
-    <p:notesMasterId r:id="rId8"/>
+    <p:notesMasterId r:id="rId9"/>
   </p:notesMasterIdLst>
   <p:sldIdLst>
     <p:sldId id="265" r:id="rId2"/>
@@ -14,6 +14,7 @@
     <p:sldId id="268" r:id="rId5"/>
     <p:sldId id="269" r:id="rId6"/>
     <p:sldId id="448" r:id="rId7"/>
+    <p:sldId id="449" r:id="rId8"/>
   </p:sldIdLst>
   <p:sldSz cx="12192000" cy="6858000"/>
   <p:notesSz cx="6858000" cy="9144000"/>
@@ -202,7 +203,7 @@
           <a:p>
             <a:fld id="{659F289F-6C09-4E41-AB64-F4FBAF604A8F}" type="datetimeFigureOut">
               <a:rPr kumimoji="1" lang="ja-JP" altLang="en-US" smtClean="0"/>
-              <a:t>2023/5/27</a:t>
+              <a:t>2024/8/24</a:t>
             </a:fld>
             <a:endParaRPr kumimoji="1" lang="ja-JP" altLang="en-US"/>
           </a:p>
@@ -602,6 +603,107 @@
 </p:notes>
 </file>
 
+<file path=ppt/notesSlides/notesSlide2.xml><?xml version="1.0" encoding="utf-8"?>
+<p:notes xmlns:a="http://schemas.openxmlformats.org/drawingml/2006/main" xmlns:r="http://schemas.openxmlformats.org/officeDocument/2006/relationships" xmlns:p="http://schemas.openxmlformats.org/presentationml/2006/main">
+  <p:cSld>
+    <p:spTree>
+      <p:nvGrpSpPr>
+        <p:cNvPr id="1" name=""/>
+        <p:cNvGrpSpPr/>
+        <p:nvPr/>
+      </p:nvGrpSpPr>
+      <p:grpSpPr>
+        <a:xfrm>
+          <a:off x="0" y="0"/>
+          <a:ext cx="0" cy="0"/>
+          <a:chOff x="0" y="0"/>
+          <a:chExt cx="0" cy="0"/>
+        </a:xfrm>
+      </p:grpSpPr>
+      <p:sp>
+        <p:nvSpPr>
+          <p:cNvPr id="2" name="スライド イメージ プレースホルダー 1"/>
+          <p:cNvSpPr>
+            <a:spLocks noGrp="1" noRot="1" noChangeAspect="1"/>
+          </p:cNvSpPr>
+          <p:nvPr>
+            <p:ph type="sldImg"/>
+          </p:nvPr>
+        </p:nvSpPr>
+        <p:spPr/>
+      </p:sp>
+      <p:sp>
+        <p:nvSpPr>
+          <p:cNvPr id="3" name="ノート プレースホルダー 2"/>
+          <p:cNvSpPr>
+            <a:spLocks noGrp="1"/>
+          </p:cNvSpPr>
+          <p:nvPr>
+            <p:ph type="body" idx="1"/>
+          </p:nvPr>
+        </p:nvSpPr>
+        <p:spPr/>
+        <p:txBody>
+          <a:bodyPr/>
+          <a:lstStyle/>
+          <a:p>
+            <a:pPr marL="0" marR="0" lvl="0" indent="0" algn="l" defTabSz="914400" rtl="0" eaLnBrk="1" fontAlgn="auto" latinLnBrk="0" hangingPunct="1">
+              <a:lnSpc>
+                <a:spcPct val="100000"/>
+              </a:lnSpc>
+              <a:spcBef>
+                <a:spcPts val="0"/>
+              </a:spcBef>
+              <a:spcAft>
+                <a:spcPts val="0"/>
+              </a:spcAft>
+              <a:buClrTx/>
+              <a:buSzTx/>
+              <a:buFontTx/>
+              <a:buNone/>
+              <a:tabLst/>
+              <a:defRPr/>
+            </a:pPr>
+            <a:endParaRPr kumimoji="1" lang="en-US" altLang="ja-JP" dirty="0"/>
+          </a:p>
+        </p:txBody>
+      </p:sp>
+      <p:sp>
+        <p:nvSpPr>
+          <p:cNvPr id="4" name="スライド番号プレースホルダー 3"/>
+          <p:cNvSpPr>
+            <a:spLocks noGrp="1"/>
+          </p:cNvSpPr>
+          <p:nvPr>
+            <p:ph type="sldNum" sz="quarter" idx="5"/>
+          </p:nvPr>
+        </p:nvSpPr>
+        <p:spPr/>
+        <p:txBody>
+          <a:bodyPr/>
+          <a:lstStyle/>
+          <a:p>
+            <a:fld id="{63A79F27-1E42-4BBB-99C6-DF7CF67A2388}" type="slidenum">
+              <a:rPr kumimoji="1" lang="ja-JP" altLang="en-US" smtClean="0"/>
+              <a:t>7</a:t>
+            </a:fld>
+            <a:endParaRPr kumimoji="1" lang="ja-JP" altLang="en-US"/>
+          </a:p>
+        </p:txBody>
+      </p:sp>
+    </p:spTree>
+    <p:extLst>
+      <p:ext uri="{BB962C8B-B14F-4D97-AF65-F5344CB8AC3E}">
+        <p14:creationId xmlns:p14="http://schemas.microsoft.com/office/powerpoint/2010/main" val="924082555"/>
+      </p:ext>
+    </p:extLst>
+  </p:cSld>
+  <p:clrMapOvr>
+    <a:masterClrMapping/>
+  </p:clrMapOvr>
+</p:notes>
+</file>
+
 <file path=ppt/slideLayouts/slideLayout1.xml><?xml version="1.0" encoding="utf-8"?>
 <p:sldLayout xmlns:a="http://schemas.openxmlformats.org/drawingml/2006/main" xmlns:r="http://schemas.openxmlformats.org/officeDocument/2006/relationships" xmlns:p="http://schemas.openxmlformats.org/presentationml/2006/main" type="title" preserve="1">
   <p:cSld name="タイトル スライド">
@@ -733,7 +835,7 @@
           <a:p>
             <a:fld id="{B3DF8FAD-2AB0-4DA8-8497-F48AD089473F}" type="datetimeFigureOut">
               <a:rPr kumimoji="1" lang="ja-JP" altLang="en-US" smtClean="0"/>
-              <a:t>2023/5/27</a:t>
+              <a:t>2024/8/24</a:t>
             </a:fld>
             <a:endParaRPr kumimoji="1" lang="ja-JP" altLang="en-US"/>
           </a:p>
@@ -935,7 +1037,7 @@
           <a:p>
             <a:fld id="{B3DF8FAD-2AB0-4DA8-8497-F48AD089473F}" type="datetimeFigureOut">
               <a:rPr kumimoji="1" lang="ja-JP" altLang="en-US" smtClean="0"/>
-              <a:t>2023/5/27</a:t>
+              <a:t>2024/8/24</a:t>
             </a:fld>
             <a:endParaRPr kumimoji="1" lang="ja-JP" altLang="en-US"/>
           </a:p>
@@ -1147,7 +1249,7 @@
           <a:p>
             <a:fld id="{B3DF8FAD-2AB0-4DA8-8497-F48AD089473F}" type="datetimeFigureOut">
               <a:rPr kumimoji="1" lang="ja-JP" altLang="en-US" smtClean="0"/>
-              <a:t>2023/5/27</a:t>
+              <a:t>2024/8/24</a:t>
             </a:fld>
             <a:endParaRPr kumimoji="1" lang="ja-JP" altLang="en-US"/>
           </a:p>
@@ -1349,7 +1451,7 @@
           <a:p>
             <a:fld id="{B3DF8FAD-2AB0-4DA8-8497-F48AD089473F}" type="datetimeFigureOut">
               <a:rPr kumimoji="1" lang="ja-JP" altLang="en-US" smtClean="0"/>
-              <a:t>2023/5/27</a:t>
+              <a:t>2024/8/24</a:t>
             </a:fld>
             <a:endParaRPr kumimoji="1" lang="ja-JP" altLang="en-US"/>
           </a:p>
@@ -1595,7 +1697,7 @@
           <a:p>
             <a:fld id="{B3DF8FAD-2AB0-4DA8-8497-F48AD089473F}" type="datetimeFigureOut">
               <a:rPr kumimoji="1" lang="ja-JP" altLang="en-US" smtClean="0"/>
-              <a:t>2023/5/27</a:t>
+              <a:t>2024/8/24</a:t>
             </a:fld>
             <a:endParaRPr kumimoji="1" lang="ja-JP" altLang="en-US"/>
           </a:p>
@@ -1891,7 +1993,7 @@
           <a:p>
             <a:fld id="{B3DF8FAD-2AB0-4DA8-8497-F48AD089473F}" type="datetimeFigureOut">
               <a:rPr kumimoji="1" lang="ja-JP" altLang="en-US" smtClean="0"/>
-              <a:t>2023/5/27</a:t>
+              <a:t>2024/8/24</a:t>
             </a:fld>
             <a:endParaRPr kumimoji="1" lang="ja-JP" altLang="en-US"/>
           </a:p>
@@ -2322,7 +2424,7 @@
           <a:p>
             <a:fld id="{B3DF8FAD-2AB0-4DA8-8497-F48AD089473F}" type="datetimeFigureOut">
               <a:rPr kumimoji="1" lang="ja-JP" altLang="en-US" smtClean="0"/>
-              <a:t>2023/5/27</a:t>
+              <a:t>2024/8/24</a:t>
             </a:fld>
             <a:endParaRPr kumimoji="1" lang="ja-JP" altLang="en-US"/>
           </a:p>
@@ -2440,7 +2542,7 @@
           <a:p>
             <a:fld id="{B3DF8FAD-2AB0-4DA8-8497-F48AD089473F}" type="datetimeFigureOut">
               <a:rPr kumimoji="1" lang="ja-JP" altLang="en-US" smtClean="0"/>
-              <a:t>2023/5/27</a:t>
+              <a:t>2024/8/24</a:t>
             </a:fld>
             <a:endParaRPr kumimoji="1" lang="ja-JP" altLang="en-US"/>
           </a:p>
@@ -2535,7 +2637,7 @@
           <a:p>
             <a:fld id="{B3DF8FAD-2AB0-4DA8-8497-F48AD089473F}" type="datetimeFigureOut">
               <a:rPr kumimoji="1" lang="ja-JP" altLang="en-US" smtClean="0"/>
-              <a:t>2023/5/27</a:t>
+              <a:t>2024/8/24</a:t>
             </a:fld>
             <a:endParaRPr kumimoji="1" lang="ja-JP" altLang="en-US"/>
           </a:p>
@@ -2844,7 +2946,7 @@
           <a:p>
             <a:fld id="{B3DF8FAD-2AB0-4DA8-8497-F48AD089473F}" type="datetimeFigureOut">
               <a:rPr kumimoji="1" lang="ja-JP" altLang="en-US" smtClean="0"/>
-              <a:t>2023/5/27</a:t>
+              <a:t>2024/8/24</a:t>
             </a:fld>
             <a:endParaRPr kumimoji="1" lang="ja-JP" altLang="en-US"/>
           </a:p>
@@ -3101,7 +3203,7 @@
           <a:p>
             <a:fld id="{B3DF8FAD-2AB0-4DA8-8497-F48AD089473F}" type="datetimeFigureOut">
               <a:rPr kumimoji="1" lang="ja-JP" altLang="en-US" smtClean="0"/>
-              <a:t>2023/5/27</a:t>
+              <a:t>2024/8/24</a:t>
             </a:fld>
             <a:endParaRPr kumimoji="1" lang="ja-JP" altLang="en-US"/>
           </a:p>
@@ -3346,7 +3448,7 @@
           <a:p>
             <a:fld id="{B3DF8FAD-2AB0-4DA8-8497-F48AD089473F}" type="datetimeFigureOut">
               <a:rPr kumimoji="1" lang="ja-JP" altLang="en-US" smtClean="0"/>
-              <a:t>2023/5/27</a:t>
+              <a:t>2024/8/24</a:t>
             </a:fld>
             <a:endParaRPr kumimoji="1" lang="ja-JP" altLang="en-US"/>
           </a:p>
@@ -39534,6 +39636,120 @@
 </p:sld>
 </file>
 
+<file path=ppt/slides/slide7.xml><?xml version="1.0" encoding="utf-8"?>
+<p:sld xmlns:a="http://schemas.openxmlformats.org/drawingml/2006/main" xmlns:r="http://schemas.openxmlformats.org/officeDocument/2006/relationships" xmlns:p="http://schemas.openxmlformats.org/presentationml/2006/main">
+  <p:cSld>
+    <p:spTree>
+      <p:nvGrpSpPr>
+        <p:cNvPr id="1" name=""/>
+        <p:cNvGrpSpPr/>
+        <p:nvPr/>
+      </p:nvGrpSpPr>
+      <p:grpSpPr>
+        <a:xfrm>
+          <a:off x="0" y="0"/>
+          <a:ext cx="0" cy="0"/>
+          <a:chOff x="0" y="0"/>
+          <a:chExt cx="0" cy="0"/>
+        </a:xfrm>
+      </p:grpSpPr>
+      <p:sp>
+        <p:nvSpPr>
+          <p:cNvPr id="8" name="テキスト ボックス 7">
+            <a:extLst>
+              <a:ext uri="{FF2B5EF4-FFF2-40B4-BE49-F238E27FC236}">
+                <a16:creationId xmlns:a16="http://schemas.microsoft.com/office/drawing/2014/main" id="{660F79BC-033E-B1F3-DF81-6C79869EC121}"/>
+              </a:ext>
+            </a:extLst>
+          </p:cNvPr>
+          <p:cNvSpPr txBox="1"/>
+          <p:nvPr/>
+        </p:nvSpPr>
+        <p:spPr>
+          <a:xfrm>
+            <a:off x="254668" y="164251"/>
+            <a:ext cx="11640821" cy="461665"/>
+          </a:xfrm>
+          <a:prstGeom prst="rect">
+            <a:avLst/>
+          </a:prstGeom>
+          <a:noFill/>
+        </p:spPr>
+        <p:txBody>
+          <a:bodyPr wrap="square" rtlCol="0">
+            <a:spAutoFit/>
+          </a:bodyPr>
+          <a:lstStyle/>
+          <a:p>
+            <a:r>
+              <a:rPr lang="en-US" altLang="ja-JP" sz="2400" dirty="0">
+                <a:latin typeface="+mn-ea"/>
+                <a:cs typeface="Mplus 1p" panose="020B0502020203020207" pitchFamily="50" charset="-128"/>
+              </a:rPr>
+              <a:t>Summary label</a:t>
+            </a:r>
+            <a:endParaRPr lang="ja-JP" altLang="en-US" sz="2400" dirty="0">
+              <a:latin typeface="+mn-ea"/>
+              <a:cs typeface="Mplus 1p" panose="020B0502020203020207" pitchFamily="50" charset="-128"/>
+            </a:endParaRPr>
+          </a:p>
+        </p:txBody>
+      </p:sp>
+      <p:sp>
+        <p:nvSpPr>
+          <p:cNvPr id="10" name="テキスト ボックス 9">
+            <a:extLst>
+              <a:ext uri="{FF2B5EF4-FFF2-40B4-BE49-F238E27FC236}">
+                <a16:creationId xmlns:a16="http://schemas.microsoft.com/office/drawing/2014/main" id="{BB6FF907-C69E-9891-135E-289D2A1C913E}"/>
+              </a:ext>
+            </a:extLst>
+          </p:cNvPr>
+          <p:cNvSpPr txBox="1"/>
+          <p:nvPr/>
+        </p:nvSpPr>
+        <p:spPr>
+          <a:xfrm>
+            <a:off x="254669" y="557276"/>
+            <a:ext cx="7243010" cy="369332"/>
+          </a:xfrm>
+          <a:prstGeom prst="rect">
+            <a:avLst/>
+          </a:prstGeom>
+          <a:noFill/>
+        </p:spPr>
+        <p:txBody>
+          <a:bodyPr wrap="square" rtlCol="0">
+            <a:spAutoFit/>
+          </a:bodyPr>
+          <a:lstStyle/>
+          <a:p>
+            <a:r>
+              <a:rPr lang="en-US" altLang="ja-JP" dirty="0">
+                <a:latin typeface="+mn-ea"/>
+                <a:cs typeface="Mplus 1p" panose="020B0502020203020207" pitchFamily="50" charset="-128"/>
+              </a:rPr>
+              <a:t>Spindle analysis</a:t>
+            </a:r>
+            <a:endParaRPr lang="ja-JP" altLang="en-US" dirty="0">
+              <a:latin typeface="+mn-ea"/>
+              <a:cs typeface="Mplus 1p" panose="020B0502020203020207" pitchFamily="50" charset="-128"/>
+            </a:endParaRPr>
+          </a:p>
+        </p:txBody>
+      </p:sp>
+    </p:spTree>
+    <p:extLst>
+      <p:ext uri="{BB962C8B-B14F-4D97-AF65-F5344CB8AC3E}">
+        <p14:creationId xmlns:p14="http://schemas.microsoft.com/office/powerpoint/2010/main" val="1617513702"/>
+      </p:ext>
+    </p:extLst>
+  </p:cSld>
+  <p:clrMapOvr>
+    <a:masterClrMapping/>
+  </p:clrMapOvr>
+</p:sld>
+</file>
+
 <file path=ppt/theme/theme1.xml><?xml version="1.0" encoding="utf-8"?>
 <a:theme xmlns:a="http://schemas.openxmlformats.org/drawingml/2006/main" name="Office テーマ">
   <a:themeElements>

</xml_diff>

<commit_message>
[UPD] slide followed the module update
</commit_message>
<xml_diff>
--- a/faster2lib/EEG_power_specrum_template.pptx
+++ b/faster2lib/EEG_power_specrum_template.pptx
@@ -203,7 +203,7 @@
           <a:p>
             <a:fld id="{659F289F-6C09-4E41-AB64-F4FBAF604A8F}" type="datetimeFigureOut">
               <a:rPr kumimoji="1" lang="ja-JP" altLang="en-US" smtClean="0"/>
-              <a:t>2024/8/24</a:t>
+              <a:t>2024/9/12</a:t>
             </a:fld>
             <a:endParaRPr kumimoji="1" lang="ja-JP" altLang="en-US"/>
           </a:p>
@@ -835,7 +835,7 @@
           <a:p>
             <a:fld id="{B3DF8FAD-2AB0-4DA8-8497-F48AD089473F}" type="datetimeFigureOut">
               <a:rPr kumimoji="1" lang="ja-JP" altLang="en-US" smtClean="0"/>
-              <a:t>2024/8/24</a:t>
+              <a:t>2024/9/12</a:t>
             </a:fld>
             <a:endParaRPr kumimoji="1" lang="ja-JP" altLang="en-US"/>
           </a:p>
@@ -1037,7 +1037,7 @@
           <a:p>
             <a:fld id="{B3DF8FAD-2AB0-4DA8-8497-F48AD089473F}" type="datetimeFigureOut">
               <a:rPr kumimoji="1" lang="ja-JP" altLang="en-US" smtClean="0"/>
-              <a:t>2024/8/24</a:t>
+              <a:t>2024/9/12</a:t>
             </a:fld>
             <a:endParaRPr kumimoji="1" lang="ja-JP" altLang="en-US"/>
           </a:p>
@@ -1249,7 +1249,7 @@
           <a:p>
             <a:fld id="{B3DF8FAD-2AB0-4DA8-8497-F48AD089473F}" type="datetimeFigureOut">
               <a:rPr kumimoji="1" lang="ja-JP" altLang="en-US" smtClean="0"/>
-              <a:t>2024/8/24</a:t>
+              <a:t>2024/9/12</a:t>
             </a:fld>
             <a:endParaRPr kumimoji="1" lang="ja-JP" altLang="en-US"/>
           </a:p>
@@ -1451,7 +1451,7 @@
           <a:p>
             <a:fld id="{B3DF8FAD-2AB0-4DA8-8497-F48AD089473F}" type="datetimeFigureOut">
               <a:rPr kumimoji="1" lang="ja-JP" altLang="en-US" smtClean="0"/>
-              <a:t>2024/8/24</a:t>
+              <a:t>2024/9/12</a:t>
             </a:fld>
             <a:endParaRPr kumimoji="1" lang="ja-JP" altLang="en-US"/>
           </a:p>
@@ -1697,7 +1697,7 @@
           <a:p>
             <a:fld id="{B3DF8FAD-2AB0-4DA8-8497-F48AD089473F}" type="datetimeFigureOut">
               <a:rPr kumimoji="1" lang="ja-JP" altLang="en-US" smtClean="0"/>
-              <a:t>2024/8/24</a:t>
+              <a:t>2024/9/12</a:t>
             </a:fld>
             <a:endParaRPr kumimoji="1" lang="ja-JP" altLang="en-US"/>
           </a:p>
@@ -1993,7 +1993,7 @@
           <a:p>
             <a:fld id="{B3DF8FAD-2AB0-4DA8-8497-F48AD089473F}" type="datetimeFigureOut">
               <a:rPr kumimoji="1" lang="ja-JP" altLang="en-US" smtClean="0"/>
-              <a:t>2024/8/24</a:t>
+              <a:t>2024/9/12</a:t>
             </a:fld>
             <a:endParaRPr kumimoji="1" lang="ja-JP" altLang="en-US"/>
           </a:p>
@@ -2424,7 +2424,7 @@
           <a:p>
             <a:fld id="{B3DF8FAD-2AB0-4DA8-8497-F48AD089473F}" type="datetimeFigureOut">
               <a:rPr kumimoji="1" lang="ja-JP" altLang="en-US" smtClean="0"/>
-              <a:t>2024/8/24</a:t>
+              <a:t>2024/9/12</a:t>
             </a:fld>
             <a:endParaRPr kumimoji="1" lang="ja-JP" altLang="en-US"/>
           </a:p>
@@ -2542,7 +2542,7 @@
           <a:p>
             <a:fld id="{B3DF8FAD-2AB0-4DA8-8497-F48AD089473F}" type="datetimeFigureOut">
               <a:rPr kumimoji="1" lang="ja-JP" altLang="en-US" smtClean="0"/>
-              <a:t>2024/8/24</a:t>
+              <a:t>2024/9/12</a:t>
             </a:fld>
             <a:endParaRPr kumimoji="1" lang="ja-JP" altLang="en-US"/>
           </a:p>
@@ -2637,7 +2637,7 @@
           <a:p>
             <a:fld id="{B3DF8FAD-2AB0-4DA8-8497-F48AD089473F}" type="datetimeFigureOut">
               <a:rPr kumimoji="1" lang="ja-JP" altLang="en-US" smtClean="0"/>
-              <a:t>2024/8/24</a:t>
+              <a:t>2024/9/12</a:t>
             </a:fld>
             <a:endParaRPr kumimoji="1" lang="ja-JP" altLang="en-US"/>
           </a:p>
@@ -2946,7 +2946,7 @@
           <a:p>
             <a:fld id="{B3DF8FAD-2AB0-4DA8-8497-F48AD089473F}" type="datetimeFigureOut">
               <a:rPr kumimoji="1" lang="ja-JP" altLang="en-US" smtClean="0"/>
-              <a:t>2024/8/24</a:t>
+              <a:t>2024/9/12</a:t>
             </a:fld>
             <a:endParaRPr kumimoji="1" lang="ja-JP" altLang="en-US"/>
           </a:p>
@@ -3203,7 +3203,7 @@
           <a:p>
             <a:fld id="{B3DF8FAD-2AB0-4DA8-8497-F48AD089473F}" type="datetimeFigureOut">
               <a:rPr kumimoji="1" lang="ja-JP" altLang="en-US" smtClean="0"/>
-              <a:t>2024/8/24</a:t>
+              <a:t>2024/9/12</a:t>
             </a:fld>
             <a:endParaRPr kumimoji="1" lang="ja-JP" altLang="en-US"/>
           </a:p>
@@ -3448,7 +3448,7 @@
           <a:p>
             <a:fld id="{B3DF8FAD-2AB0-4DA8-8497-F48AD089473F}" type="datetimeFigureOut">
               <a:rPr kumimoji="1" lang="ja-JP" altLang="en-US" smtClean="0"/>
-              <a:t>2024/8/24</a:t>
+              <a:t>2024/9/12</a:t>
             </a:fld>
             <a:endParaRPr kumimoji="1" lang="ja-JP" altLang="en-US"/>
           </a:p>
@@ -39737,6 +39737,358 @@
           </a:p>
         </p:txBody>
       </p:sp>
+      <p:sp>
+        <p:nvSpPr>
+          <p:cNvPr id="3" name="テキスト ボックス 2">
+            <a:extLst>
+              <a:ext uri="{FF2B5EF4-FFF2-40B4-BE49-F238E27FC236}">
+                <a16:creationId xmlns:a16="http://schemas.microsoft.com/office/drawing/2014/main" id="{66B2D5D0-A5FE-B59F-1C2A-DB4B991A75D7}"/>
+              </a:ext>
+            </a:extLst>
+          </p:cNvPr>
+          <p:cNvSpPr txBox="1"/>
+          <p:nvPr/>
+        </p:nvSpPr>
+        <p:spPr>
+          <a:xfrm>
+            <a:off x="254669" y="557276"/>
+            <a:ext cx="7243010" cy="369332"/>
+          </a:xfrm>
+          <a:prstGeom prst="rect">
+            <a:avLst/>
+          </a:prstGeom>
+          <a:noFill/>
+        </p:spPr>
+        <p:txBody>
+          <a:bodyPr wrap="square" rtlCol="0">
+            <a:spAutoFit/>
+          </a:bodyPr>
+          <a:lstStyle/>
+          <a:p>
+            <a:r>
+              <a:rPr lang="en-US" altLang="ja-JP" dirty="0">
+                <a:latin typeface="+mn-ea"/>
+                <a:cs typeface="Mplus 1p" panose="020B0502020203020207" pitchFamily="50" charset="-128"/>
+              </a:rPr>
+              <a:t>Spindle analysis</a:t>
+            </a:r>
+            <a:endParaRPr lang="ja-JP" altLang="en-US" dirty="0">
+              <a:latin typeface="+mn-ea"/>
+              <a:cs typeface="Mplus 1p" panose="020B0502020203020207" pitchFamily="50" charset="-128"/>
+            </a:endParaRPr>
+          </a:p>
+        </p:txBody>
+      </p:sp>
+      <p:sp>
+        <p:nvSpPr>
+          <p:cNvPr id="4" name="テキスト ボックス 3">
+            <a:extLst>
+              <a:ext uri="{FF2B5EF4-FFF2-40B4-BE49-F238E27FC236}">
+                <a16:creationId xmlns:a16="http://schemas.microsoft.com/office/drawing/2014/main" id="{2D429E26-FC5F-45A8-9C31-1256EEEF84CE}"/>
+              </a:ext>
+            </a:extLst>
+          </p:cNvPr>
+          <p:cNvSpPr txBox="1"/>
+          <p:nvPr/>
+        </p:nvSpPr>
+        <p:spPr>
+          <a:xfrm>
+            <a:off x="564982" y="867873"/>
+            <a:ext cx="3130798" cy="338554"/>
+          </a:xfrm>
+          <a:prstGeom prst="rect">
+            <a:avLst/>
+          </a:prstGeom>
+          <a:noFill/>
+          <a:ln>
+            <a:solidFill>
+              <a:schemeClr val="tx1"/>
+            </a:solidFill>
+          </a:ln>
+        </p:spPr>
+        <p:txBody>
+          <a:bodyPr wrap="square" rtlCol="0">
+            <a:spAutoFit/>
+          </a:bodyPr>
+          <a:lstStyle/>
+          <a:p>
+            <a:pPr algn="ctr"/>
+            <a:r>
+              <a:rPr kumimoji="1" lang="en-US" altLang="ja-JP" sz="1600" dirty="0">
+                <a:latin typeface="游ゴシック" panose="020B0400000000000000" pitchFamily="50" charset="-128"/>
+                <a:ea typeface="游ゴシック" panose="020B0400000000000000" pitchFamily="50" charset="-128"/>
+              </a:rPr>
+              <a:t># spindle per NREM length(s)</a:t>
+            </a:r>
+            <a:endParaRPr kumimoji="1" lang="ja-JP" altLang="en-US" sz="1600" dirty="0">
+              <a:latin typeface="游ゴシック" panose="020B0400000000000000" pitchFamily="50" charset="-128"/>
+              <a:ea typeface="游ゴシック" panose="020B0400000000000000" pitchFamily="50" charset="-128"/>
+            </a:endParaRPr>
+          </a:p>
+        </p:txBody>
+      </p:sp>
+      <p:sp>
+        <p:nvSpPr>
+          <p:cNvPr id="5" name="テキスト ボックス 4">
+            <a:extLst>
+              <a:ext uri="{FF2B5EF4-FFF2-40B4-BE49-F238E27FC236}">
+                <a16:creationId xmlns:a16="http://schemas.microsoft.com/office/drawing/2014/main" id="{E43928F2-26CE-2ED3-A274-0AFA7019FA47}"/>
+              </a:ext>
+            </a:extLst>
+          </p:cNvPr>
+          <p:cNvSpPr txBox="1"/>
+          <p:nvPr/>
+        </p:nvSpPr>
+        <p:spPr>
+          <a:xfrm>
+            <a:off x="4739379" y="867873"/>
+            <a:ext cx="3130798" cy="338554"/>
+          </a:xfrm>
+          <a:prstGeom prst="rect">
+            <a:avLst/>
+          </a:prstGeom>
+          <a:noFill/>
+          <a:ln>
+            <a:solidFill>
+              <a:schemeClr val="tx1"/>
+            </a:solidFill>
+          </a:ln>
+        </p:spPr>
+        <p:txBody>
+          <a:bodyPr wrap="square" rtlCol="0">
+            <a:spAutoFit/>
+          </a:bodyPr>
+          <a:lstStyle/>
+          <a:p>
+            <a:pPr algn="ctr"/>
+            <a:r>
+              <a:rPr kumimoji="1" lang="en-US" altLang="ja-JP" sz="1600" b="1" dirty="0">
+                <a:latin typeface="游ゴシック" panose="020B0400000000000000" pitchFamily="50" charset="-128"/>
+                <a:ea typeface="游ゴシック" panose="020B0400000000000000" pitchFamily="50" charset="-128"/>
+              </a:rPr>
+              <a:t>NREM</a:t>
+            </a:r>
+            <a:r>
+              <a:rPr kumimoji="1" lang="en-US" altLang="ja-JP" sz="1600" dirty="0">
+                <a:latin typeface="游ゴシック" panose="020B0400000000000000" pitchFamily="50" charset="-128"/>
+                <a:ea typeface="游ゴシック" panose="020B0400000000000000" pitchFamily="50" charset="-128"/>
+              </a:rPr>
+              <a:t> </a:t>
+            </a:r>
+            <a:r>
+              <a:rPr kumimoji="1" lang="ja-JP" altLang="en-US" sz="1600" dirty="0">
+                <a:latin typeface="游ゴシック" panose="020B0400000000000000" pitchFamily="50" charset="-128"/>
+                <a:ea typeface="游ゴシック" panose="020B0400000000000000" pitchFamily="50" charset="-128"/>
+              </a:rPr>
+              <a:t>→ </a:t>
+            </a:r>
+            <a:r>
+              <a:rPr kumimoji="1" lang="en-US" altLang="ja-JP" sz="1600" dirty="0">
+                <a:latin typeface="游ゴシック" panose="020B0400000000000000" pitchFamily="50" charset="-128"/>
+                <a:ea typeface="游ゴシック" panose="020B0400000000000000" pitchFamily="50" charset="-128"/>
+              </a:rPr>
+              <a:t>REM</a:t>
+            </a:r>
+            <a:endParaRPr kumimoji="1" lang="ja-JP" altLang="en-US" sz="1600" dirty="0">
+              <a:latin typeface="游ゴシック" panose="020B0400000000000000" pitchFamily="50" charset="-128"/>
+              <a:ea typeface="游ゴシック" panose="020B0400000000000000" pitchFamily="50" charset="-128"/>
+            </a:endParaRPr>
+          </a:p>
+        </p:txBody>
+      </p:sp>
+      <p:sp>
+        <p:nvSpPr>
+          <p:cNvPr id="6" name="テキスト ボックス 5">
+            <a:extLst>
+              <a:ext uri="{FF2B5EF4-FFF2-40B4-BE49-F238E27FC236}">
+                <a16:creationId xmlns:a16="http://schemas.microsoft.com/office/drawing/2014/main" id="{45EC4989-1741-F5D2-E099-B528E9B2A9C0}"/>
+              </a:ext>
+            </a:extLst>
+          </p:cNvPr>
+          <p:cNvSpPr txBox="1"/>
+          <p:nvPr/>
+        </p:nvSpPr>
+        <p:spPr>
+          <a:xfrm>
+            <a:off x="4739379" y="3913931"/>
+            <a:ext cx="3130798" cy="338554"/>
+          </a:xfrm>
+          <a:prstGeom prst="rect">
+            <a:avLst/>
+          </a:prstGeom>
+          <a:noFill/>
+          <a:ln>
+            <a:solidFill>
+              <a:schemeClr val="tx1"/>
+            </a:solidFill>
+          </a:ln>
+        </p:spPr>
+        <p:txBody>
+          <a:bodyPr wrap="square" rtlCol="0">
+            <a:spAutoFit/>
+          </a:bodyPr>
+          <a:lstStyle/>
+          <a:p>
+            <a:pPr algn="ctr"/>
+            <a:r>
+              <a:rPr kumimoji="1" lang="en-US" altLang="ja-JP" sz="1600" b="1" dirty="0">
+                <a:latin typeface="游ゴシック" panose="020B0400000000000000" pitchFamily="50" charset="-128"/>
+                <a:ea typeface="游ゴシック" panose="020B0400000000000000" pitchFamily="50" charset="-128"/>
+              </a:rPr>
+              <a:t>NREM</a:t>
+            </a:r>
+            <a:r>
+              <a:rPr kumimoji="1" lang="en-US" altLang="ja-JP" sz="1600" dirty="0">
+                <a:latin typeface="游ゴシック" panose="020B0400000000000000" pitchFamily="50" charset="-128"/>
+                <a:ea typeface="游ゴシック" panose="020B0400000000000000" pitchFamily="50" charset="-128"/>
+              </a:rPr>
+              <a:t> </a:t>
+            </a:r>
+            <a:r>
+              <a:rPr kumimoji="1" lang="ja-JP" altLang="en-US" sz="1600" dirty="0">
+                <a:latin typeface="游ゴシック" panose="020B0400000000000000" pitchFamily="50" charset="-128"/>
+                <a:ea typeface="游ゴシック" panose="020B0400000000000000" pitchFamily="50" charset="-128"/>
+              </a:rPr>
+              <a:t>→ </a:t>
+            </a:r>
+            <a:r>
+              <a:rPr kumimoji="1" lang="en-US" altLang="ja-JP" sz="1600" dirty="0">
+                <a:latin typeface="游ゴシック" panose="020B0400000000000000" pitchFamily="50" charset="-128"/>
+                <a:ea typeface="游ゴシック" panose="020B0400000000000000" pitchFamily="50" charset="-128"/>
+              </a:rPr>
+              <a:t>Wake</a:t>
+            </a:r>
+            <a:endParaRPr kumimoji="1" lang="ja-JP" altLang="en-US" sz="1600" dirty="0">
+              <a:latin typeface="游ゴシック" panose="020B0400000000000000" pitchFamily="50" charset="-128"/>
+              <a:ea typeface="游ゴシック" panose="020B0400000000000000" pitchFamily="50" charset="-128"/>
+            </a:endParaRPr>
+          </a:p>
+        </p:txBody>
+      </p:sp>
+      <p:sp>
+        <p:nvSpPr>
+          <p:cNvPr id="7" name="テキスト ボックス 6">
+            <a:extLst>
+              <a:ext uri="{FF2B5EF4-FFF2-40B4-BE49-F238E27FC236}">
+                <a16:creationId xmlns:a16="http://schemas.microsoft.com/office/drawing/2014/main" id="{1A7521E9-AFBA-5354-D6B0-83B6732A9452}"/>
+              </a:ext>
+            </a:extLst>
+          </p:cNvPr>
+          <p:cNvSpPr txBox="1"/>
+          <p:nvPr/>
+        </p:nvSpPr>
+        <p:spPr>
+          <a:xfrm>
+            <a:off x="8764691" y="3913931"/>
+            <a:ext cx="3130798" cy="338554"/>
+          </a:xfrm>
+          <a:prstGeom prst="rect">
+            <a:avLst/>
+          </a:prstGeom>
+          <a:noFill/>
+          <a:ln>
+            <a:solidFill>
+              <a:schemeClr val="tx1"/>
+            </a:solidFill>
+          </a:ln>
+        </p:spPr>
+        <p:txBody>
+          <a:bodyPr wrap="square" rtlCol="0">
+            <a:spAutoFit/>
+          </a:bodyPr>
+          <a:lstStyle/>
+          <a:p>
+            <a:pPr algn="ctr"/>
+            <a:r>
+              <a:rPr kumimoji="1" lang="en-US" altLang="ja-JP" sz="1600" dirty="0">
+                <a:latin typeface="游ゴシック" panose="020B0400000000000000" pitchFamily="50" charset="-128"/>
+                <a:ea typeface="游ゴシック" panose="020B0400000000000000" pitchFamily="50" charset="-128"/>
+              </a:rPr>
+              <a:t>WAKE </a:t>
+            </a:r>
+            <a:r>
+              <a:rPr lang="ja-JP" altLang="en-US" sz="1600" dirty="0">
+                <a:latin typeface="游ゴシック" panose="020B0400000000000000" pitchFamily="50" charset="-128"/>
+                <a:ea typeface="游ゴシック" panose="020B0400000000000000" pitchFamily="50" charset="-128"/>
+              </a:rPr>
+              <a:t>→ </a:t>
+            </a:r>
+            <a:r>
+              <a:rPr lang="en-US" altLang="ja-JP" sz="1600" b="1" dirty="0">
+                <a:latin typeface="游ゴシック" panose="020B0400000000000000" pitchFamily="50" charset="-128"/>
+                <a:ea typeface="游ゴシック" panose="020B0400000000000000" pitchFamily="50" charset="-128"/>
+              </a:rPr>
+              <a:t>NREM</a:t>
+            </a:r>
+            <a:endParaRPr kumimoji="1" lang="ja-JP" altLang="en-US" sz="1600" b="1" dirty="0">
+              <a:latin typeface="游ゴシック" panose="020B0400000000000000" pitchFamily="50" charset="-128"/>
+              <a:ea typeface="游ゴシック" panose="020B0400000000000000" pitchFamily="50" charset="-128"/>
+            </a:endParaRPr>
+          </a:p>
+        </p:txBody>
+      </p:sp>
+      <p:sp>
+        <p:nvSpPr>
+          <p:cNvPr id="9" name="テキスト ボックス 8">
+            <a:extLst>
+              <a:ext uri="{FF2B5EF4-FFF2-40B4-BE49-F238E27FC236}">
+                <a16:creationId xmlns:a16="http://schemas.microsoft.com/office/drawing/2014/main" id="{E2777318-F6D4-7699-0D2F-726B6A62C863}"/>
+              </a:ext>
+            </a:extLst>
+          </p:cNvPr>
+          <p:cNvSpPr txBox="1"/>
+          <p:nvPr/>
+        </p:nvSpPr>
+        <p:spPr>
+          <a:xfrm>
+            <a:off x="8764691" y="867873"/>
+            <a:ext cx="3130798" cy="338554"/>
+          </a:xfrm>
+          <a:prstGeom prst="rect">
+            <a:avLst/>
+          </a:prstGeom>
+          <a:noFill/>
+          <a:ln>
+            <a:solidFill>
+              <a:schemeClr val="tx1"/>
+            </a:solidFill>
+          </a:ln>
+        </p:spPr>
+        <p:txBody>
+          <a:bodyPr wrap="square" rtlCol="0">
+            <a:spAutoFit/>
+          </a:bodyPr>
+          <a:lstStyle/>
+          <a:p>
+            <a:pPr algn="ctr"/>
+            <a:r>
+              <a:rPr kumimoji="1" lang="en-US" altLang="ja-JP" sz="1600" dirty="0">
+                <a:latin typeface="游ゴシック" panose="020B0400000000000000" pitchFamily="50" charset="-128"/>
+                <a:ea typeface="游ゴシック" panose="020B0400000000000000" pitchFamily="50" charset="-128"/>
+              </a:rPr>
+              <a:t>REM </a:t>
+            </a:r>
+            <a:r>
+              <a:rPr kumimoji="1" lang="ja-JP" altLang="en-US" sz="1600" dirty="0">
+                <a:latin typeface="游ゴシック" panose="020B0400000000000000" pitchFamily="50" charset="-128"/>
+                <a:ea typeface="游ゴシック" panose="020B0400000000000000" pitchFamily="50" charset="-128"/>
+              </a:rPr>
+              <a:t>→ </a:t>
+            </a:r>
+            <a:r>
+              <a:rPr kumimoji="1" lang="en-US" altLang="ja-JP" sz="1600" b="1" dirty="0">
+                <a:latin typeface="游ゴシック" panose="020B0400000000000000" pitchFamily="50" charset="-128"/>
+                <a:ea typeface="游ゴシック" panose="020B0400000000000000" pitchFamily="50" charset="-128"/>
+              </a:rPr>
+              <a:t>NREM</a:t>
+            </a:r>
+            <a:endParaRPr kumimoji="1" lang="ja-JP" altLang="en-US" sz="1600" b="1" dirty="0">
+              <a:latin typeface="游ゴシック" panose="020B0400000000000000" pitchFamily="50" charset="-128"/>
+              <a:ea typeface="游ゴシック" panose="020B0400000000000000" pitchFamily="50" charset="-128"/>
+            </a:endParaRPr>
+          </a:p>
+        </p:txBody>
+      </p:sp>
     </p:spTree>
     <p:extLst>
       <p:ext uri="{BB962C8B-B14F-4D97-AF65-F5344CB8AC3E}">

</xml_diff>